<commit_message>
[기획] changed file tracking test
Signed-off-by: JuNijen <wjstldms0823@naver.com>
</commit_message>
<xml_diff>
--- a/Documents/기획/퍼즐 게임 컨셉 기획서 취합본.pptx
+++ b/Documents/기획/퍼즐 게임 컨셉 기획서 취합본.pptx
@@ -5,7 +5,7 @@
     <p:sldMasterId id="2147483648" r:id="rId1"/>
   </p:sldMasterIdLst>
   <p:notesMasterIdLst>
-    <p:notesMasterId r:id="rId19"/>
+    <p:notesMasterId r:id="rId20"/>
   </p:notesMasterIdLst>
   <p:sldIdLst>
     <p:sldId id="257" r:id="rId2"/>
@@ -25,18 +25,20 @@
     <p:sldId id="357" r:id="rId16"/>
     <p:sldId id="358" r:id="rId17"/>
     <p:sldId id="359" r:id="rId18"/>
+    <p:sldId id="360" r:id="rId19"/>
   </p:sldIdLst>
   <p:sldSz cx="9144000" cy="6858000" type="screen4x3"/>
   <p:notesSz cx="6858000" cy="9144000"/>
   <p:embeddedFontLst>
     <p:embeddedFont>
-      <p:font typeface="맑은 고딕" panose="020B0503020000020004" pitchFamily="50" charset="-127"/>
-      <p:regular r:id="rId20"/>
-      <p:bold r:id="rId21"/>
+      <p:font typeface="KoPub돋움체 Bold" panose="00000800000000000000" pitchFamily="2" charset="-127"/>
+      <p:regular r:id="rId21"/>
+      <p:bold r:id="rId22"/>
     </p:embeddedFont>
     <p:embeddedFont>
-      <p:font typeface="KoPub돋움체 Bold" panose="02020603020101020101" pitchFamily="18" charset="-127"/>
-      <p:regular r:id="rId22"/>
+      <p:font typeface="맑은 고딕" panose="020B0503020000020004" pitchFamily="50" charset="-127"/>
+      <p:regular r:id="rId23"/>
+      <p:bold r:id="rId24"/>
     </p:embeddedFont>
   </p:embeddedFontLst>
   <p:defaultTextStyle>
@@ -1491,6 +1493,117 @@
     <p:extLst>
       <p:ext uri="{BB962C8B-B14F-4D97-AF65-F5344CB8AC3E}">
         <p14:creationId xmlns:p14="http://schemas.microsoft.com/office/powerpoint/2010/main" val="1315624910"/>
+      </p:ext>
+    </p:extLst>
+  </p:cSld>
+  <p:clrMapOvr>
+    <a:masterClrMapping/>
+  </p:clrMapOvr>
+</p:notes>
+</file>
+
+<file path=ppt/notesSlides/notesSlide18.xml><?xml version="1.0" encoding="utf-8"?>
+<p:notes xmlns:a="http://schemas.openxmlformats.org/drawingml/2006/main" xmlns:r="http://schemas.openxmlformats.org/officeDocument/2006/relationships" xmlns:p="http://schemas.openxmlformats.org/presentationml/2006/main">
+  <p:cSld>
+    <p:spTree>
+      <p:nvGrpSpPr>
+        <p:cNvPr id="1" name=""/>
+        <p:cNvGrpSpPr/>
+        <p:nvPr/>
+      </p:nvGrpSpPr>
+      <p:grpSpPr>
+        <a:xfrm>
+          <a:off x="0" y="0"/>
+          <a:ext cx="0" cy="0"/>
+          <a:chOff x="0" y="0"/>
+          <a:chExt cx="0" cy="0"/>
+        </a:xfrm>
+      </p:grpSpPr>
+      <p:sp>
+        <p:nvSpPr>
+          <p:cNvPr id="2" name="슬라이드 이미지 개체 틀 1"/>
+          <p:cNvSpPr>
+            <a:spLocks noGrp="1" noRot="1" noChangeAspect="1"/>
+          </p:cNvSpPr>
+          <p:nvPr>
+            <p:ph type="sldImg"/>
+          </p:nvPr>
+        </p:nvSpPr>
+        <p:spPr/>
+      </p:sp>
+      <p:sp>
+        <p:nvSpPr>
+          <p:cNvPr id="3" name="슬라이드 노트 개체 틀 2"/>
+          <p:cNvSpPr>
+            <a:spLocks noGrp="1"/>
+          </p:cNvSpPr>
+          <p:nvPr>
+            <p:ph type="body" idx="1"/>
+          </p:nvPr>
+        </p:nvSpPr>
+        <p:spPr/>
+        <p:txBody>
+          <a:bodyPr>
+            <a:normAutofit/>
+          </a:bodyPr>
+          <a:lstStyle/>
+          <a:p>
+            <a:pPr marL="0" marR="0" indent="0" algn="l" defTabSz="914400" rtl="0" eaLnBrk="1" fontAlgn="auto" latinLnBrk="1" hangingPunct="1">
+              <a:lnSpc>
+                <a:spcPct val="100000"/>
+              </a:lnSpc>
+              <a:spcBef>
+                <a:spcPts val="0"/>
+              </a:spcBef>
+              <a:spcAft>
+                <a:spcPts val="0"/>
+              </a:spcAft>
+              <a:buClrTx/>
+              <a:buSzTx/>
+              <a:buFontTx/>
+              <a:buNone/>
+              <a:tabLst/>
+              <a:defRPr/>
+            </a:pPr>
+            <a:r>
+              <a:rPr lang="en-US" altLang="ko-KR" sz="1200" dirty="0"/>
+              <a:t>http://minheeblog.tistory.com/category/PPT</a:t>
+            </a:r>
+            <a:endParaRPr lang="ko-KR" altLang="en-US" sz="1200" dirty="0"/>
+          </a:p>
+          <a:p>
+            <a:endParaRPr lang="ko-KR" altLang="en-US" dirty="0"/>
+          </a:p>
+        </p:txBody>
+      </p:sp>
+      <p:sp>
+        <p:nvSpPr>
+          <p:cNvPr id="4" name="슬라이드 번호 개체 틀 3"/>
+          <p:cNvSpPr>
+            <a:spLocks noGrp="1"/>
+          </p:cNvSpPr>
+          <p:nvPr>
+            <p:ph type="sldNum" sz="quarter" idx="10"/>
+          </p:nvPr>
+        </p:nvSpPr>
+        <p:spPr/>
+        <p:txBody>
+          <a:bodyPr/>
+          <a:lstStyle/>
+          <a:p>
+            <a:fld id="{04A4E647-5A0F-41E6-A0EF-B58D8C1C6CD4}" type="slidenum">
+              <a:rPr lang="ko-KR" altLang="en-US" smtClean="0"/>
+              <a:pPr/>
+              <a:t>18</a:t>
+            </a:fld>
+            <a:endParaRPr lang="ko-KR" altLang="en-US"/>
+          </a:p>
+        </p:txBody>
+      </p:sp>
+    </p:spTree>
+    <p:extLst>
+      <p:ext uri="{BB962C8B-B14F-4D97-AF65-F5344CB8AC3E}">
+        <p14:creationId xmlns:p14="http://schemas.microsoft.com/office/powerpoint/2010/main" val="183519054"/>
       </p:ext>
     </p:extLst>
   </p:cSld>
@@ -5348,7 +5461,7 @@
           <a:p>
             <a:pPr algn="ctr"/>
             <a:r>
-              <a:rPr lang="ko-KR" altLang="en-US" sz="3200" b="1" spc="-150" dirty="0" smtClean="0">
+              <a:rPr lang="ko-KR" altLang="en-US" sz="3200" b="1" spc="-150" dirty="0">
                 <a:solidFill>
                   <a:schemeClr val="bg1"/>
                 </a:solidFill>
@@ -5358,7 +5471,7 @@
               <a:t>퍼즐게임 컨셉 기획서 </a:t>
             </a:r>
             <a:r>
-              <a:rPr lang="ko-KR" altLang="en-US" sz="3200" b="1" spc="-150" dirty="0" err="1" smtClean="0">
+              <a:rPr lang="ko-KR" altLang="en-US" sz="3200" b="1" spc="-150" dirty="0" err="1">
                 <a:solidFill>
                   <a:schemeClr val="bg1"/>
                 </a:solidFill>
@@ -5419,13 +5532,6 @@
   <p:clrMapOvr>
     <a:masterClrMapping/>
   </p:clrMapOvr>
-  <p:timing>
-    <p:tnLst>
-      <p:par>
-        <p:cTn id="1" dur="indefinite" restart="never" nodeType="tmRoot"/>
-      </p:par>
-    </p:tnLst>
-  </p:timing>
 </p:sld>
 </file>
 
@@ -5580,7 +5686,7 @@
           <a:p>
             <a:pPr algn="ctr"/>
             <a:r>
-              <a:rPr lang="en-US" altLang="ko-KR" sz="2400" dirty="0" smtClean="0">
+              <a:rPr lang="en-US" altLang="ko-KR" sz="2400" dirty="0">
                 <a:solidFill>
                   <a:schemeClr val="bg1"/>
                 </a:solidFill>
@@ -5622,7 +5728,7 @@
           <a:lstStyle/>
           <a:p>
             <a:r>
-              <a:rPr lang="ko-KR" altLang="en-US" sz="2000" b="1" spc="-150" dirty="0" smtClean="0">
+              <a:rPr lang="ko-KR" altLang="en-US" sz="2000" b="1" spc="-150" dirty="0">
                 <a:solidFill>
                   <a:schemeClr val="tx2">
                     <a:lumMod val="75000"/>
@@ -5634,7 +5740,7 @@
               <a:t>미니게임 </a:t>
             </a:r>
             <a:r>
-              <a:rPr lang="en-US" altLang="ko-KR" sz="2000" b="1" spc="-150" dirty="0" smtClean="0">
+              <a:rPr lang="en-US" altLang="ko-KR" sz="2000" b="1" spc="-150" dirty="0">
                 <a:solidFill>
                   <a:schemeClr val="tx2">
                     <a:lumMod val="75000"/>
@@ -5646,7 +5752,7 @@
               <a:t>– </a:t>
             </a:r>
             <a:r>
-              <a:rPr lang="ko-KR" altLang="en-US" sz="2000" b="1" spc="-150" dirty="0" err="1" smtClean="0">
+              <a:rPr lang="ko-KR" altLang="en-US" sz="2000" b="1" spc="-150" dirty="0" err="1">
                 <a:solidFill>
                   <a:schemeClr val="tx2">
                     <a:lumMod val="75000"/>
@@ -5718,7 +5824,7 @@
               </a:lnSpc>
             </a:pPr>
             <a:r>
-              <a:rPr lang="ko-KR" altLang="en-US" sz="1400" dirty="0" smtClean="0">
+              <a:rPr lang="ko-KR" altLang="en-US" sz="1400" dirty="0">
                 <a:solidFill>
                   <a:schemeClr val="tx1"/>
                 </a:solidFill>
@@ -5728,7 +5834,7 @@
               <a:t>미로에 있는 미니게임 벽에서 나오는 퍼즐 중에 한가지다</a:t>
             </a:r>
             <a:r>
-              <a:rPr lang="en-US" altLang="ko-KR" sz="1400" dirty="0" smtClean="0">
+              <a:rPr lang="en-US" altLang="ko-KR" sz="1400" dirty="0">
                 <a:solidFill>
                   <a:schemeClr val="tx1"/>
                 </a:solidFill>
@@ -5738,7 +5844,7 @@
               <a:t>. 5</a:t>
             </a:r>
             <a:r>
-              <a:rPr lang="ko-KR" altLang="en-US" sz="1400" dirty="0" smtClean="0">
+              <a:rPr lang="ko-KR" altLang="en-US" sz="1400" dirty="0">
                 <a:solidFill>
                   <a:schemeClr val="tx1"/>
                 </a:solidFill>
@@ -5748,7 +5854,7 @@
               <a:t>개 단위의 정사각형이 붙어 이루어진 도형으로 모양을 만드는 퍼즐이다</a:t>
             </a:r>
             <a:r>
-              <a:rPr lang="en-US" altLang="ko-KR" sz="1400" dirty="0" smtClean="0">
+              <a:rPr lang="en-US" altLang="ko-KR" sz="1400" dirty="0">
                 <a:solidFill>
                   <a:schemeClr val="tx1"/>
                 </a:solidFill>
@@ -5758,7 +5864,7 @@
               <a:t>. </a:t>
             </a:r>
             <a:r>
-              <a:rPr lang="ko-KR" altLang="en-US" sz="1400" dirty="0" smtClean="0">
+              <a:rPr lang="ko-KR" altLang="en-US" sz="1400" dirty="0">
                 <a:solidFill>
                   <a:schemeClr val="tx1"/>
                 </a:solidFill>
@@ -5768,7 +5874,7 @@
               <a:t>조각은 알파벳 모양이다</a:t>
             </a:r>
             <a:r>
-              <a:rPr lang="en-US" altLang="ko-KR" sz="1400" dirty="0" smtClean="0">
+              <a:rPr lang="en-US" altLang="ko-KR" sz="1400" dirty="0">
                 <a:solidFill>
                   <a:schemeClr val="tx1"/>
                 </a:solidFill>
@@ -5778,7 +5884,7 @@
               <a:t>. </a:t>
             </a:r>
             <a:r>
-              <a:rPr lang="ko-KR" altLang="en-US" sz="1400" dirty="0" err="1" smtClean="0">
+              <a:rPr lang="ko-KR" altLang="en-US" sz="1400" dirty="0" err="1">
                 <a:solidFill>
                   <a:schemeClr val="tx1"/>
                 </a:solidFill>
@@ -5788,7 +5894,7 @@
               <a:t>미니게임에서는</a:t>
             </a:r>
             <a:r>
-              <a:rPr lang="ko-KR" altLang="en-US" sz="1400" dirty="0" smtClean="0">
+              <a:rPr lang="ko-KR" altLang="en-US" sz="1400" dirty="0">
                 <a:solidFill>
                   <a:schemeClr val="tx1"/>
                 </a:solidFill>
@@ -5798,7 +5904,7 @@
               <a:t> 미니게임이 시작하면 랜덤으로 </a:t>
             </a:r>
             <a:r>
-              <a:rPr lang="ko-KR" altLang="en-US" sz="1400" dirty="0" err="1" smtClean="0">
+              <a:rPr lang="ko-KR" altLang="en-US" sz="1400" dirty="0" err="1">
                 <a:solidFill>
                   <a:schemeClr val="tx1"/>
                 </a:solidFill>
@@ -5808,7 +5914,7 @@
               <a:t>펜토미노</a:t>
             </a:r>
             <a:r>
-              <a:rPr lang="ko-KR" altLang="en-US" sz="1400" dirty="0" smtClean="0">
+              <a:rPr lang="ko-KR" altLang="en-US" sz="1400" dirty="0">
                 <a:solidFill>
                   <a:schemeClr val="tx1"/>
                 </a:solidFill>
@@ -5818,7 +5924,7 @@
               <a:t> 도안이 나오고 화면 오른쪽에 있는 블록들을 단축키를 이용해 복제 </a:t>
             </a:r>
             <a:r>
-              <a:rPr lang="en-US" altLang="ko-KR" sz="1400" dirty="0" smtClean="0">
+              <a:rPr lang="en-US" altLang="ko-KR" sz="1400" dirty="0">
                 <a:solidFill>
                   <a:schemeClr val="tx1"/>
                 </a:solidFill>
@@ -5828,7 +5934,7 @@
               <a:t>or </a:t>
             </a:r>
             <a:r>
-              <a:rPr lang="ko-KR" altLang="en-US" sz="1400" dirty="0" smtClean="0">
+              <a:rPr lang="ko-KR" altLang="en-US" sz="1400" dirty="0">
                 <a:solidFill>
                   <a:schemeClr val="tx1"/>
                 </a:solidFill>
@@ -5838,7 +5944,7 @@
               <a:t>변형해서 도안에 맞게 블록을 끼워 넣으면 퍼즐이 완료된다</a:t>
             </a:r>
             <a:r>
-              <a:rPr lang="en-US" altLang="ko-KR" sz="1400" dirty="0" smtClean="0">
+              <a:rPr lang="en-US" altLang="ko-KR" sz="1400" dirty="0">
                 <a:solidFill>
                   <a:schemeClr val="tx1"/>
                 </a:solidFill>
@@ -5848,7 +5954,7 @@
               <a:t>.</a:t>
             </a:r>
             <a:br>
-              <a:rPr lang="en-US" altLang="ko-KR" sz="1400" dirty="0" smtClean="0">
+              <a:rPr lang="en-US" altLang="ko-KR" sz="1400" dirty="0">
                 <a:solidFill>
                   <a:schemeClr val="tx1"/>
                 </a:solidFill>
@@ -5856,37 +5962,27 @@
                 <a:ea typeface="KoPub돋움체 Bold"/>
               </a:rPr>
             </a:br>
-            <a:r>
-              <a:rPr lang="en-US" altLang="ko-KR" sz="1400" dirty="0" smtClean="0">
+            <a:br>
+              <a:rPr lang="en-US" altLang="ko-KR" sz="1400" dirty="0">
                 <a:solidFill>
                   <a:schemeClr val="tx1"/>
                 </a:solidFill>
                 <a:latin typeface="KoPub돋움체 Bold" pitchFamily="18" charset="-127"/>
                 <a:ea typeface="KoPub돋움체 Bold"/>
               </a:rPr>
-              <a:t/>
-            </a:r>
-            <a:br>
-              <a:rPr lang="en-US" altLang="ko-KR" sz="1400" dirty="0" smtClean="0">
+            </a:br>
+            <a:r>
+              <a:rPr lang="ko-KR" altLang="en-US" sz="1400" dirty="0">
                 <a:solidFill>
                   <a:schemeClr val="tx1"/>
                 </a:solidFill>
                 <a:latin typeface="KoPub돋움체 Bold" pitchFamily="18" charset="-127"/>
                 <a:ea typeface="KoPub돋움체 Bold"/>
               </a:rPr>
-            </a:br>
-            <a:r>
-              <a:rPr lang="ko-KR" altLang="en-US" sz="1400" dirty="0" smtClean="0">
-                <a:solidFill>
-                  <a:schemeClr val="tx1"/>
-                </a:solidFill>
-                <a:latin typeface="KoPub돋움체 Bold" pitchFamily="18" charset="-127"/>
-                <a:ea typeface="KoPub돋움체 Bold"/>
-              </a:rPr>
               <a:t>사용하는 단축키 </a:t>
             </a:r>
             <a:r>
-              <a:rPr lang="en-US" altLang="ko-KR" sz="1400" dirty="0" smtClean="0">
+              <a:rPr lang="en-US" altLang="ko-KR" sz="1400" dirty="0">
                 <a:solidFill>
                   <a:schemeClr val="tx1"/>
                 </a:solidFill>
@@ -5917,7 +6013,7 @@
               </a:lnSpc>
             </a:pPr>
             <a:r>
-              <a:rPr lang="ko-KR" altLang="en-US" sz="1400" dirty="0" smtClean="0">
+              <a:rPr lang="ko-KR" altLang="en-US" sz="1400" dirty="0">
                 <a:solidFill>
                   <a:schemeClr val="tx1"/>
                 </a:solidFill>
@@ -5927,7 +6023,7 @@
               <a:t>기획의도 </a:t>
             </a:r>
             <a:r>
-              <a:rPr lang="en-US" altLang="ko-KR" sz="1400" dirty="0" smtClean="0">
+              <a:rPr lang="en-US" altLang="ko-KR" sz="1400" dirty="0">
                 <a:solidFill>
                   <a:schemeClr val="tx1"/>
                 </a:solidFill>
@@ -5937,7 +6033,7 @@
               <a:t>: </a:t>
             </a:r>
             <a:r>
-              <a:rPr lang="ko-KR" altLang="en-US" sz="1400" dirty="0" err="1" smtClean="0">
+              <a:rPr lang="ko-KR" altLang="en-US" sz="1400" dirty="0" err="1">
                 <a:solidFill>
                   <a:schemeClr val="tx1"/>
                 </a:solidFill>
@@ -5947,7 +6043,7 @@
               <a:t>펜토미노</a:t>
             </a:r>
             <a:r>
-              <a:rPr lang="ko-KR" altLang="en-US" sz="1400" dirty="0" smtClean="0">
+              <a:rPr lang="ko-KR" altLang="en-US" sz="1400" dirty="0">
                 <a:solidFill>
                   <a:schemeClr val="tx1"/>
                 </a:solidFill>
@@ -5957,7 +6053,7 @@
               <a:t> 퍼즐로 플레이어에게 </a:t>
             </a:r>
             <a:r>
-              <a:rPr lang="ko-KR" altLang="en-US" sz="1400" dirty="0" err="1" smtClean="0">
+              <a:rPr lang="ko-KR" altLang="en-US" sz="1400" dirty="0" err="1">
                 <a:solidFill>
                   <a:schemeClr val="tx1"/>
                 </a:solidFill>
@@ -5967,7 +6063,7 @@
               <a:t>자유변형</a:t>
             </a:r>
             <a:r>
-              <a:rPr lang="ko-KR" altLang="en-US" sz="1400" dirty="0" smtClean="0">
+              <a:rPr lang="ko-KR" altLang="en-US" sz="1400" dirty="0">
                 <a:solidFill>
                   <a:schemeClr val="tx1"/>
                 </a:solidFill>
@@ -5977,7 +6073,7 @@
               <a:t> 단축키를 이용해 완성 가능하지 기획</a:t>
             </a:r>
             <a:r>
-              <a:rPr lang="en-US" altLang="ko-KR" sz="1400" dirty="0" smtClean="0">
+              <a:rPr lang="en-US" altLang="ko-KR" sz="1400" dirty="0">
                 <a:solidFill>
                   <a:schemeClr val="tx1"/>
                 </a:solidFill>
@@ -6020,23 +6116,19 @@
           <a:p>
             <a:pPr algn="ctr"/>
             <a:r>
-              <a:rPr lang="ko-KR" altLang="en-US" sz="1600" b="1" spc="-150" dirty="0" err="1" smtClean="0">
+              <a:rPr lang="ko-KR" altLang="en-US" sz="1600" b="1" spc="-150" dirty="0" err="1">
                 <a:latin typeface="KoPub돋움체 Bold" pitchFamily="18" charset="-127"/>
                 <a:ea typeface="KoPub돋움체 Bold" pitchFamily="18" charset="-127"/>
               </a:rPr>
               <a:t>펜토미노</a:t>
             </a:r>
             <a:r>
-              <a:rPr lang="ko-KR" altLang="en-US" sz="1600" b="1" spc="-150" dirty="0" smtClean="0">
+              <a:rPr lang="ko-KR" altLang="en-US" sz="1600" b="1" spc="-150" dirty="0">
                 <a:latin typeface="KoPub돋움체 Bold" pitchFamily="18" charset="-127"/>
                 <a:ea typeface="KoPub돋움체 Bold" pitchFamily="18" charset="-127"/>
               </a:rPr>
               <a:t> 레퍼런스 자료</a:t>
             </a:r>
-            <a:endParaRPr lang="ko-KR" altLang="en-US" sz="1600" b="1" spc="-150" dirty="0">
-              <a:latin typeface="KoPub돋움체 Bold" pitchFamily="18" charset="-127"/>
-              <a:ea typeface="KoPub돋움체 Bold" pitchFamily="18" charset="-127"/>
-            </a:endParaRPr>
           </a:p>
         </p:txBody>
       </p:sp>
@@ -6091,13 +6183,6 @@
   <p:clrMapOvr>
     <a:masterClrMapping/>
   </p:clrMapOvr>
-  <p:timing>
-    <p:tnLst>
-      <p:par>
-        <p:cTn id="1" dur="indefinite" restart="never" nodeType="tmRoot"/>
-      </p:par>
-    </p:tnLst>
-  </p:timing>
 </p:sld>
 </file>
 
@@ -6252,7 +6337,7 @@
           <a:p>
             <a:pPr algn="ctr"/>
             <a:r>
-              <a:rPr lang="en-US" altLang="ko-KR" sz="2400" dirty="0" smtClean="0">
+              <a:rPr lang="en-US" altLang="ko-KR" sz="2400" dirty="0">
                 <a:solidFill>
                   <a:schemeClr val="bg1"/>
                 </a:solidFill>
@@ -6294,7 +6379,7 @@
           <a:lstStyle/>
           <a:p>
             <a:r>
-              <a:rPr lang="ko-KR" altLang="en-US" sz="2000" b="1" spc="-150" dirty="0" smtClean="0">
+              <a:rPr lang="ko-KR" altLang="en-US" sz="2000" b="1" spc="-150" dirty="0">
                 <a:solidFill>
                   <a:schemeClr val="tx2">
                     <a:lumMod val="75000"/>
@@ -6306,7 +6391,7 @@
               <a:t>미니게임 </a:t>
             </a:r>
             <a:r>
-              <a:rPr lang="en-US" altLang="ko-KR" sz="2000" b="1" spc="-150" dirty="0" smtClean="0">
+              <a:rPr lang="en-US" altLang="ko-KR" sz="2000" b="1" spc="-150" dirty="0">
                 <a:solidFill>
                   <a:schemeClr val="tx2">
                     <a:lumMod val="75000"/>
@@ -6318,7 +6403,7 @@
               <a:t>– </a:t>
             </a:r>
             <a:r>
-              <a:rPr lang="ko-KR" altLang="en-US" sz="2000" b="1" spc="-150" dirty="0" err="1" smtClean="0">
+              <a:rPr lang="ko-KR" altLang="en-US" sz="2000" b="1" spc="-150" dirty="0" err="1">
                 <a:solidFill>
                   <a:schemeClr val="tx2">
                     <a:lumMod val="75000"/>
@@ -6330,7 +6415,7 @@
               <a:t>펜토미노</a:t>
             </a:r>
             <a:r>
-              <a:rPr lang="ko-KR" altLang="en-US" sz="2000" b="1" spc="-150" dirty="0" smtClean="0">
+              <a:rPr lang="ko-KR" altLang="en-US" sz="2000" b="1" spc="-150" dirty="0">
                 <a:solidFill>
                   <a:schemeClr val="tx2">
                     <a:lumMod val="75000"/>
@@ -6341,15 +6426,6 @@
               </a:rPr>
               <a:t> 화면</a:t>
             </a:r>
-            <a:endParaRPr lang="ko-KR" altLang="en-US" sz="2000" b="1" spc="-150" dirty="0">
-              <a:solidFill>
-                <a:schemeClr val="tx2">
-                  <a:lumMod val="75000"/>
-                </a:schemeClr>
-              </a:solidFill>
-              <a:latin typeface="KoPub돋움체 Bold" panose="02030600000101010101" pitchFamily="18" charset="-127"/>
-              <a:ea typeface="KoPub돋움체 Bold" panose="02030600000101010101" pitchFamily="18" charset="-127"/>
-            </a:endParaRPr>
           </a:p>
         </p:txBody>
       </p:sp>
@@ -7275,23 +7351,19 @@
           <a:p>
             <a:pPr algn="ctr"/>
             <a:r>
-              <a:rPr lang="ko-KR" altLang="en-US" sz="1600" b="1" spc="-150" dirty="0" err="1" smtClean="0">
+              <a:rPr lang="ko-KR" altLang="en-US" sz="1600" b="1" spc="-150" dirty="0" err="1">
                 <a:latin typeface="KoPub돋움체 Bold" pitchFamily="18" charset="-127"/>
                 <a:ea typeface="KoPub돋움체 Bold" pitchFamily="18" charset="-127"/>
               </a:rPr>
               <a:t>펜토미노</a:t>
             </a:r>
             <a:r>
-              <a:rPr lang="ko-KR" altLang="en-US" sz="1600" b="1" spc="-150" dirty="0" smtClean="0">
+              <a:rPr lang="ko-KR" altLang="en-US" sz="1600" b="1" spc="-150" dirty="0">
                 <a:latin typeface="KoPub돋움체 Bold" pitchFamily="18" charset="-127"/>
                 <a:ea typeface="KoPub돋움체 Bold" pitchFamily="18" charset="-127"/>
               </a:rPr>
               <a:t> 임시 화면</a:t>
             </a:r>
-            <a:endParaRPr lang="ko-KR" altLang="en-US" sz="1600" b="1" spc="-150" dirty="0">
-              <a:latin typeface="KoPub돋움체 Bold" pitchFamily="18" charset="-127"/>
-              <a:ea typeface="KoPub돋움체 Bold" pitchFamily="18" charset="-127"/>
-            </a:endParaRPr>
           </a:p>
         </p:txBody>
       </p:sp>
@@ -7305,13 +7377,6 @@
   <p:clrMapOvr>
     <a:masterClrMapping/>
   </p:clrMapOvr>
-  <p:timing>
-    <p:tnLst>
-      <p:par>
-        <p:cTn id="1" dur="indefinite" restart="never" nodeType="tmRoot"/>
-      </p:par>
-    </p:tnLst>
-  </p:timing>
 </p:sld>
 </file>
 
@@ -7466,7 +7531,7 @@
           <a:p>
             <a:pPr algn="ctr"/>
             <a:r>
-              <a:rPr lang="en-US" altLang="ko-KR" sz="2400" dirty="0" smtClean="0">
+              <a:rPr lang="en-US" altLang="ko-KR" sz="2400" dirty="0">
                 <a:solidFill>
                   <a:schemeClr val="bg1"/>
                 </a:solidFill>
@@ -7508,7 +7573,7 @@
           <a:lstStyle/>
           <a:p>
             <a:r>
-              <a:rPr lang="ko-KR" altLang="en-US" sz="2000" b="1" spc="-150" dirty="0" smtClean="0">
+              <a:rPr lang="ko-KR" altLang="en-US" sz="2000" b="1" spc="-150" dirty="0">
                 <a:solidFill>
                   <a:schemeClr val="tx2">
                     <a:lumMod val="75000"/>
@@ -7520,7 +7585,7 @@
               <a:t>미니게임 </a:t>
             </a:r>
             <a:r>
-              <a:rPr lang="en-US" altLang="ko-KR" sz="2000" b="1" spc="-150" dirty="0" smtClean="0">
+              <a:rPr lang="en-US" altLang="ko-KR" sz="2000" b="1" spc="-150" dirty="0">
                 <a:solidFill>
                   <a:schemeClr val="tx2">
                     <a:lumMod val="75000"/>
@@ -7532,7 +7597,7 @@
               <a:t>– </a:t>
             </a:r>
             <a:r>
-              <a:rPr lang="ko-KR" altLang="en-US" sz="2000" b="1" spc="-150" dirty="0" err="1" smtClean="0">
+              <a:rPr lang="ko-KR" altLang="en-US" sz="2000" b="1" spc="-150" dirty="0" err="1">
                 <a:solidFill>
                   <a:schemeClr val="tx2">
                     <a:lumMod val="75000"/>
@@ -7604,7 +7669,7 @@
               </a:lnSpc>
             </a:pPr>
             <a:r>
-              <a:rPr lang="ko-KR" altLang="en-US" sz="1400" dirty="0" smtClean="0">
+              <a:rPr lang="ko-KR" altLang="en-US" sz="1400" dirty="0">
                 <a:solidFill>
                   <a:schemeClr val="tx1"/>
                 </a:solidFill>
@@ -7614,7 +7679,7 @@
               <a:t>미로에 있는 미니게임 벽에서 나오는 퍼즐 중에 한가지다</a:t>
             </a:r>
             <a:r>
-              <a:rPr lang="en-US" altLang="ko-KR" sz="1400" dirty="0" smtClean="0">
+              <a:rPr lang="en-US" altLang="ko-KR" sz="1400" dirty="0">
                 <a:solidFill>
                   <a:schemeClr val="tx1"/>
                 </a:solidFill>
@@ -7624,7 +7689,7 @@
               <a:t>. </a:t>
             </a:r>
             <a:r>
-              <a:rPr lang="ko-KR" altLang="en-US" sz="1400" dirty="0" smtClean="0">
+              <a:rPr lang="ko-KR" altLang="en-US" sz="1400" dirty="0">
                 <a:solidFill>
                   <a:schemeClr val="tx1"/>
                 </a:solidFill>
@@ -7634,7 +7699,7 @@
               <a:t>미니게임이 시작하면 일자로 된 굵은 선이 나오고 지정된 길이에 맞게 선을 </a:t>
             </a:r>
             <a:r>
-              <a:rPr lang="ko-KR" altLang="en-US" sz="1400" dirty="0" err="1" smtClean="0">
+              <a:rPr lang="ko-KR" altLang="en-US" sz="1400" dirty="0" err="1">
                 <a:solidFill>
                   <a:schemeClr val="tx1"/>
                 </a:solidFill>
@@ -7644,7 +7709,7 @@
               <a:t>잘라야한다</a:t>
             </a:r>
             <a:r>
-              <a:rPr lang="en-US" altLang="ko-KR" sz="1400" dirty="0" smtClean="0">
+              <a:rPr lang="en-US" altLang="ko-KR" sz="1400" dirty="0">
                 <a:solidFill>
                   <a:schemeClr val="tx1"/>
                 </a:solidFill>
@@ -7654,7 +7719,7 @@
               <a:t>. </a:t>
             </a:r>
             <a:r>
-              <a:rPr lang="ko-KR" altLang="en-US" sz="1400" dirty="0" smtClean="0">
+              <a:rPr lang="ko-KR" altLang="en-US" sz="1400" dirty="0">
                 <a:solidFill>
                   <a:schemeClr val="tx1"/>
                 </a:solidFill>
@@ -7664,7 +7729,7 @@
               <a:t>포토샵 </a:t>
             </a:r>
             <a:r>
-              <a:rPr lang="ko-KR" altLang="en-US" sz="1400" dirty="0" err="1" smtClean="0">
+              <a:rPr lang="ko-KR" altLang="en-US" sz="1400" dirty="0" err="1">
                 <a:solidFill>
                   <a:schemeClr val="tx1"/>
                 </a:solidFill>
@@ -7674,7 +7739,7 @@
               <a:t>눈금자</a:t>
             </a:r>
             <a:r>
-              <a:rPr lang="ko-KR" altLang="en-US" sz="1400" dirty="0" smtClean="0">
+              <a:rPr lang="ko-KR" altLang="en-US" sz="1400" dirty="0">
                 <a:solidFill>
                   <a:schemeClr val="tx1"/>
                 </a:solidFill>
@@ -7684,7 +7749,7 @@
               <a:t> 단축키를 이용해 </a:t>
             </a:r>
             <a:r>
-              <a:rPr lang="ko-KR" altLang="en-US" sz="1400" dirty="0" err="1" smtClean="0">
+              <a:rPr lang="ko-KR" altLang="en-US" sz="1400" dirty="0" err="1">
                 <a:solidFill>
                   <a:schemeClr val="tx1"/>
                 </a:solidFill>
@@ -7694,7 +7759,7 @@
               <a:t>눈금자를</a:t>
             </a:r>
             <a:r>
-              <a:rPr lang="ko-KR" altLang="en-US" sz="1400" dirty="0" smtClean="0">
+              <a:rPr lang="ko-KR" altLang="en-US" sz="1400" dirty="0">
                 <a:solidFill>
                   <a:schemeClr val="tx1"/>
                 </a:solidFill>
@@ -7704,7 +7769,7 @@
               <a:t> 나오게 하고 선을 잘라서 조건을 만족하면 퍼즐이 완료된다</a:t>
             </a:r>
             <a:r>
-              <a:rPr lang="en-US" altLang="ko-KR" sz="1400" dirty="0" smtClean="0">
+              <a:rPr lang="en-US" altLang="ko-KR" sz="1400" dirty="0">
                 <a:solidFill>
                   <a:schemeClr val="tx1"/>
                 </a:solidFill>
@@ -7714,7 +7779,7 @@
               <a:t>. </a:t>
             </a:r>
             <a:r>
-              <a:rPr lang="ko-KR" altLang="en-US" sz="1400" dirty="0" smtClean="0">
+              <a:rPr lang="ko-KR" altLang="en-US" sz="1400" dirty="0">
                 <a:solidFill>
                   <a:schemeClr val="tx1"/>
                 </a:solidFill>
@@ -7724,7 +7789,7 @@
               <a:t>오차범위 </a:t>
             </a:r>
             <a:r>
-              <a:rPr lang="en-US" altLang="ko-KR" sz="1400" dirty="0" smtClean="0">
+              <a:rPr lang="en-US" altLang="ko-KR" sz="1400" dirty="0">
                 <a:solidFill>
                   <a:schemeClr val="tx1"/>
                 </a:solidFill>
@@ -7734,7 +7799,7 @@
               <a:t>0.5cm</a:t>
             </a:r>
             <a:r>
-              <a:rPr lang="ko-KR" altLang="en-US" sz="1400" dirty="0" smtClean="0">
+              <a:rPr lang="ko-KR" altLang="en-US" sz="1400" dirty="0">
                 <a:solidFill>
                   <a:schemeClr val="tx1"/>
                 </a:solidFill>
@@ -7744,7 +7809,7 @@
               <a:t>까지 인정된다</a:t>
             </a:r>
             <a:r>
-              <a:rPr lang="en-US" altLang="ko-KR" sz="1400" dirty="0" smtClean="0">
+              <a:rPr lang="en-US" altLang="ko-KR" sz="1400" dirty="0">
                 <a:solidFill>
                   <a:schemeClr val="tx1"/>
                 </a:solidFill>
@@ -7754,7 +7819,7 @@
               <a:t>.</a:t>
             </a:r>
             <a:br>
-              <a:rPr lang="en-US" altLang="ko-KR" sz="1400" dirty="0" smtClean="0">
+              <a:rPr lang="en-US" altLang="ko-KR" sz="1400" dirty="0">
                 <a:solidFill>
                   <a:schemeClr val="tx1"/>
                 </a:solidFill>
@@ -7762,37 +7827,27 @@
                 <a:ea typeface="KoPub돋움체 Bold"/>
               </a:rPr>
             </a:br>
-            <a:r>
-              <a:rPr lang="en-US" altLang="ko-KR" sz="1400" dirty="0" smtClean="0">
+            <a:br>
+              <a:rPr lang="en-US" altLang="ko-KR" sz="1400" dirty="0">
                 <a:solidFill>
                   <a:schemeClr val="tx1"/>
                 </a:solidFill>
                 <a:latin typeface="KoPub돋움체 Bold" pitchFamily="18" charset="-127"/>
                 <a:ea typeface="KoPub돋움체 Bold"/>
               </a:rPr>
-              <a:t/>
-            </a:r>
-            <a:br>
-              <a:rPr lang="en-US" altLang="ko-KR" sz="1400" dirty="0" smtClean="0">
+            </a:br>
+            <a:r>
+              <a:rPr lang="ko-KR" altLang="en-US" sz="1400" dirty="0">
                 <a:solidFill>
                   <a:schemeClr val="tx1"/>
                 </a:solidFill>
                 <a:latin typeface="KoPub돋움체 Bold" pitchFamily="18" charset="-127"/>
                 <a:ea typeface="KoPub돋움체 Bold"/>
               </a:rPr>
-            </a:br>
-            <a:r>
-              <a:rPr lang="ko-KR" altLang="en-US" sz="1400" dirty="0" smtClean="0">
-                <a:solidFill>
-                  <a:schemeClr val="tx1"/>
-                </a:solidFill>
-                <a:latin typeface="KoPub돋움체 Bold" pitchFamily="18" charset="-127"/>
-                <a:ea typeface="KoPub돋움체 Bold"/>
-              </a:rPr>
               <a:t>사용하는 단축키 </a:t>
             </a:r>
             <a:r>
-              <a:rPr lang="en-US" altLang="ko-KR" sz="1400" dirty="0" smtClean="0">
+              <a:rPr lang="en-US" altLang="ko-KR" sz="1400" dirty="0">
                 <a:solidFill>
                   <a:schemeClr val="tx1"/>
                 </a:solidFill>
@@ -7823,7 +7878,7 @@
               </a:lnSpc>
             </a:pPr>
             <a:r>
-              <a:rPr lang="ko-KR" altLang="en-US" sz="1400" dirty="0" smtClean="0">
+              <a:rPr lang="ko-KR" altLang="en-US" sz="1400" dirty="0">
                 <a:solidFill>
                   <a:schemeClr val="tx1"/>
                 </a:solidFill>
@@ -7833,7 +7888,7 @@
               <a:t>기획의도 </a:t>
             </a:r>
             <a:r>
-              <a:rPr lang="en-US" altLang="ko-KR" sz="1400" dirty="0" smtClean="0">
+              <a:rPr lang="en-US" altLang="ko-KR" sz="1400" dirty="0">
                 <a:solidFill>
                   <a:schemeClr val="tx1"/>
                 </a:solidFill>
@@ -7843,7 +7898,7 @@
               <a:t>: </a:t>
             </a:r>
             <a:r>
-              <a:rPr lang="ko-KR" altLang="en-US" sz="1400" dirty="0" smtClean="0">
+              <a:rPr lang="ko-KR" altLang="en-US" sz="1400" dirty="0">
                 <a:solidFill>
                   <a:schemeClr val="tx1"/>
                 </a:solidFill>
@@ -7853,7 +7908,7 @@
               <a:t>플레이어가 포토샵 </a:t>
             </a:r>
             <a:r>
-              <a:rPr lang="ko-KR" altLang="en-US" sz="1400" dirty="0" err="1" smtClean="0">
+              <a:rPr lang="ko-KR" altLang="en-US" sz="1400" dirty="0" err="1">
                 <a:solidFill>
                   <a:schemeClr val="tx1"/>
                 </a:solidFill>
@@ -7863,7 +7918,7 @@
               <a:t>눈금자를</a:t>
             </a:r>
             <a:r>
-              <a:rPr lang="ko-KR" altLang="en-US" sz="1400" dirty="0" smtClean="0">
+              <a:rPr lang="ko-KR" altLang="en-US" sz="1400" dirty="0">
                 <a:solidFill>
                   <a:schemeClr val="tx1"/>
                 </a:solidFill>
@@ -7873,7 +7928,7 @@
               <a:t> 이용해 선을 자를 수 있는지 기획</a:t>
             </a:r>
             <a:r>
-              <a:rPr lang="en-US" altLang="ko-KR" sz="1400" dirty="0" smtClean="0">
+              <a:rPr lang="en-US" altLang="ko-KR" sz="1400" dirty="0">
                 <a:solidFill>
                   <a:schemeClr val="tx1"/>
                 </a:solidFill>
@@ -7916,23 +7971,19 @@
           <a:p>
             <a:pPr algn="ctr"/>
             <a:r>
-              <a:rPr lang="ko-KR" altLang="en-US" sz="1600" b="1" spc="-150" dirty="0" err="1" smtClean="0">
+              <a:rPr lang="ko-KR" altLang="en-US" sz="1600" b="1" spc="-150" dirty="0" err="1">
                 <a:latin typeface="KoPub돋움체 Bold" pitchFamily="18" charset="-127"/>
                 <a:ea typeface="KoPub돋움체 Bold" pitchFamily="18" charset="-127"/>
               </a:rPr>
               <a:t>선자르기</a:t>
             </a:r>
             <a:r>
-              <a:rPr lang="ko-KR" altLang="en-US" sz="1600" b="1" spc="-150" dirty="0" smtClean="0">
+              <a:rPr lang="ko-KR" altLang="en-US" sz="1600" b="1" spc="-150" dirty="0">
                 <a:latin typeface="KoPub돋움체 Bold" pitchFamily="18" charset="-127"/>
                 <a:ea typeface="KoPub돋움체 Bold" pitchFamily="18" charset="-127"/>
               </a:rPr>
               <a:t> 레퍼런스 자료</a:t>
             </a:r>
-            <a:endParaRPr lang="ko-KR" altLang="en-US" sz="1600" b="1" spc="-150" dirty="0">
-              <a:latin typeface="KoPub돋움체 Bold" pitchFamily="18" charset="-127"/>
-              <a:ea typeface="KoPub돋움체 Bold" pitchFamily="18" charset="-127"/>
-            </a:endParaRPr>
           </a:p>
         </p:txBody>
       </p:sp>
@@ -7976,13 +8027,6 @@
   <p:clrMapOvr>
     <a:masterClrMapping/>
   </p:clrMapOvr>
-  <p:timing>
-    <p:tnLst>
-      <p:par>
-        <p:cTn id="1" dur="indefinite" restart="never" nodeType="tmRoot"/>
-      </p:par>
-    </p:tnLst>
-  </p:timing>
 </p:sld>
 </file>
 
@@ -8137,7 +8181,7 @@
           <a:p>
             <a:pPr algn="ctr"/>
             <a:r>
-              <a:rPr lang="en-US" altLang="ko-KR" sz="2400" dirty="0" smtClean="0">
+              <a:rPr lang="en-US" altLang="ko-KR" sz="2400" dirty="0">
                 <a:solidFill>
                   <a:schemeClr val="bg1"/>
                 </a:solidFill>
@@ -8179,7 +8223,7 @@
           <a:lstStyle/>
           <a:p>
             <a:r>
-              <a:rPr lang="ko-KR" altLang="en-US" sz="2000" b="1" spc="-150" dirty="0" smtClean="0">
+              <a:rPr lang="ko-KR" altLang="en-US" sz="2000" b="1" spc="-150" dirty="0">
                 <a:solidFill>
                   <a:schemeClr val="tx2">
                     <a:lumMod val="75000"/>
@@ -8191,7 +8235,7 @@
               <a:t>미니게임 </a:t>
             </a:r>
             <a:r>
-              <a:rPr lang="en-US" altLang="ko-KR" sz="2000" b="1" spc="-150" dirty="0" smtClean="0">
+              <a:rPr lang="en-US" altLang="ko-KR" sz="2000" b="1" spc="-150" dirty="0">
                 <a:solidFill>
                   <a:schemeClr val="tx2">
                     <a:lumMod val="75000"/>
@@ -8203,7 +8247,7 @@
               <a:t>– </a:t>
             </a:r>
             <a:r>
-              <a:rPr lang="ko-KR" altLang="en-US" sz="2000" b="1" spc="-150" dirty="0" err="1" smtClean="0">
+              <a:rPr lang="ko-KR" altLang="en-US" sz="2000" b="1" spc="-150" dirty="0" err="1">
                 <a:solidFill>
                   <a:schemeClr val="tx2">
                     <a:lumMod val="75000"/>
@@ -8215,7 +8259,7 @@
               <a:t>선자르기</a:t>
             </a:r>
             <a:r>
-              <a:rPr lang="ko-KR" altLang="en-US" sz="2000" b="1" spc="-150" dirty="0" smtClean="0">
+              <a:rPr lang="ko-KR" altLang="en-US" sz="2000" b="1" spc="-150" dirty="0">
                 <a:solidFill>
                   <a:schemeClr val="tx2">
                     <a:lumMod val="75000"/>
@@ -8226,15 +8270,6 @@
               </a:rPr>
               <a:t> 화면</a:t>
             </a:r>
-            <a:endParaRPr lang="ko-KR" altLang="en-US" sz="2000" b="1" spc="-150" dirty="0">
-              <a:solidFill>
-                <a:schemeClr val="tx2">
-                  <a:lumMod val="75000"/>
-                </a:schemeClr>
-              </a:solidFill>
-              <a:latin typeface="KoPub돋움체 Bold" panose="02030600000101010101" pitchFamily="18" charset="-127"/>
-              <a:ea typeface="KoPub돋움체 Bold" panose="02030600000101010101" pitchFamily="18" charset="-127"/>
-            </a:endParaRPr>
           </a:p>
         </p:txBody>
       </p:sp>
@@ -8314,23 +8349,19 @@
           <a:p>
             <a:pPr algn="ctr"/>
             <a:r>
-              <a:rPr lang="ko-KR" altLang="en-US" sz="1600" b="1" spc="-150" dirty="0" err="1" smtClean="0">
+              <a:rPr lang="ko-KR" altLang="en-US" sz="1600" b="1" spc="-150" dirty="0" err="1">
                 <a:latin typeface="KoPub돋움체 Bold" pitchFamily="18" charset="-127"/>
                 <a:ea typeface="KoPub돋움체 Bold" pitchFamily="18" charset="-127"/>
               </a:rPr>
               <a:t>선자르기</a:t>
             </a:r>
             <a:r>
-              <a:rPr lang="ko-KR" altLang="en-US" sz="1600" b="1" spc="-150" dirty="0" smtClean="0">
+              <a:rPr lang="ko-KR" altLang="en-US" sz="1600" b="1" spc="-150" dirty="0">
                 <a:latin typeface="KoPub돋움체 Bold" pitchFamily="18" charset="-127"/>
                 <a:ea typeface="KoPub돋움체 Bold" pitchFamily="18" charset="-127"/>
               </a:rPr>
               <a:t> 임시 화면</a:t>
             </a:r>
-            <a:endParaRPr lang="ko-KR" altLang="en-US" sz="1600" b="1" spc="-150" dirty="0">
-              <a:latin typeface="KoPub돋움체 Bold" pitchFamily="18" charset="-127"/>
-              <a:ea typeface="KoPub돋움체 Bold" pitchFamily="18" charset="-127"/>
-            </a:endParaRPr>
           </a:p>
         </p:txBody>
       </p:sp>
@@ -8450,21 +8481,21 @@
             <a:p>
               <a:pPr algn="ctr"/>
               <a:r>
-                <a:rPr lang="en-US" altLang="ko-KR" sz="1600" b="1" spc="-150" dirty="0" smtClean="0">
+                <a:rPr lang="en-US" altLang="ko-KR" sz="1600" b="1" spc="-150" dirty="0">
                   <a:latin typeface="KoPub돋움체 Bold" pitchFamily="18" charset="-127"/>
                   <a:ea typeface="KoPub돋움체 Bold" pitchFamily="18" charset="-127"/>
                 </a:rPr>
                 <a:t>2cm</a:t>
               </a:r>
               <a:r>
-                <a:rPr lang="ko-KR" altLang="en-US" sz="1600" b="1" spc="-150" dirty="0" smtClean="0">
+                <a:rPr lang="ko-KR" altLang="en-US" sz="1600" b="1" spc="-150" dirty="0">
                   <a:latin typeface="KoPub돋움체 Bold" pitchFamily="18" charset="-127"/>
                   <a:ea typeface="KoPub돋움체 Bold" pitchFamily="18" charset="-127"/>
                 </a:rPr>
                 <a:t>를 남기고 잘라라</a:t>
               </a:r>
               <a:r>
-                <a:rPr lang="en-US" altLang="ko-KR" sz="1600" b="1" spc="-150" dirty="0" smtClean="0">
+                <a:rPr lang="en-US" altLang="ko-KR" sz="1600" b="1" spc="-150" dirty="0">
                   <a:solidFill>
                     <a:schemeClr val="bg1"/>
                   </a:solidFill>
@@ -8844,13 +8875,6 @@
   <p:clrMapOvr>
     <a:masterClrMapping/>
   </p:clrMapOvr>
-  <p:timing>
-    <p:tnLst>
-      <p:par>
-        <p:cTn id="1" dur="indefinite" restart="never" nodeType="tmRoot"/>
-      </p:par>
-    </p:tnLst>
-  </p:timing>
 </p:sld>
 </file>
 
@@ -9005,7 +9029,7 @@
           <a:p>
             <a:pPr algn="ctr"/>
             <a:r>
-              <a:rPr lang="en-US" altLang="ko-KR" sz="2400" dirty="0" smtClean="0">
+              <a:rPr lang="en-US" altLang="ko-KR" sz="2400" dirty="0">
                 <a:solidFill>
                   <a:schemeClr val="bg1"/>
                 </a:solidFill>
@@ -9047,7 +9071,7 @@
           <a:lstStyle/>
           <a:p>
             <a:r>
-              <a:rPr lang="ko-KR" altLang="en-US" sz="2000" b="1" spc="-150" dirty="0" smtClean="0">
+              <a:rPr lang="ko-KR" altLang="en-US" sz="2000" b="1" spc="-150" dirty="0">
                 <a:solidFill>
                   <a:schemeClr val="tx2">
                     <a:lumMod val="75000"/>
@@ -9059,7 +9083,7 @@
               <a:t>미니게임 </a:t>
             </a:r>
             <a:r>
-              <a:rPr lang="en-US" altLang="ko-KR" sz="2000" b="1" spc="-150" dirty="0" smtClean="0">
+              <a:rPr lang="en-US" altLang="ko-KR" sz="2000" b="1" spc="-150" dirty="0">
                 <a:solidFill>
                   <a:schemeClr val="tx2">
                     <a:lumMod val="75000"/>
@@ -9071,7 +9095,7 @@
               <a:t>– </a:t>
             </a:r>
             <a:r>
-              <a:rPr lang="ko-KR" altLang="en-US" sz="2000" b="1" spc="-150" dirty="0" err="1" smtClean="0">
+              <a:rPr lang="ko-KR" altLang="en-US" sz="2000" b="1" spc="-150" dirty="0" err="1">
                 <a:solidFill>
                   <a:schemeClr val="tx2">
                     <a:lumMod val="75000"/>
@@ -9143,7 +9167,7 @@
               </a:lnSpc>
             </a:pPr>
             <a:r>
-              <a:rPr lang="ko-KR" altLang="en-US" sz="1400" dirty="0" smtClean="0">
+              <a:rPr lang="ko-KR" altLang="en-US" sz="1400" dirty="0">
                 <a:solidFill>
                   <a:schemeClr val="tx1"/>
                 </a:solidFill>
@@ -9153,7 +9177,7 @@
               <a:t>미로에 있는 미니게임 벽에서 나오는 퍼즐 중에 한가지다</a:t>
             </a:r>
             <a:r>
-              <a:rPr lang="en-US" altLang="ko-KR" sz="1400" dirty="0" smtClean="0">
+              <a:rPr lang="en-US" altLang="ko-KR" sz="1400" dirty="0">
                 <a:solidFill>
                   <a:schemeClr val="tx1"/>
                 </a:solidFill>
@@ -9163,7 +9187,7 @@
               <a:t>. </a:t>
             </a:r>
             <a:r>
-              <a:rPr lang="ko-KR" altLang="en-US" sz="1400" dirty="0" smtClean="0">
+              <a:rPr lang="ko-KR" altLang="en-US" sz="1400" dirty="0">
                 <a:solidFill>
                   <a:schemeClr val="tx1"/>
                 </a:solidFill>
@@ -9183,7 +9207,7 @@
               <a:t> </a:t>
             </a:r>
             <a:r>
-              <a:rPr lang="ko-KR" altLang="en-US" sz="1400" dirty="0" smtClean="0">
+              <a:rPr lang="ko-KR" altLang="en-US" sz="1400" dirty="0">
                 <a:solidFill>
                   <a:schemeClr val="tx1"/>
                 </a:solidFill>
@@ -9193,7 +9217,7 @@
               <a:t>아래에 플레이어가 따라해야 할 채워 넣기 도형이 나열된다</a:t>
             </a:r>
             <a:r>
-              <a:rPr lang="en-US" altLang="ko-KR" sz="1400" dirty="0" smtClean="0">
+              <a:rPr lang="en-US" altLang="ko-KR" sz="1400" dirty="0">
                 <a:solidFill>
                   <a:schemeClr val="tx1"/>
                 </a:solidFill>
@@ -9203,7 +9227,7 @@
               <a:t>. </a:t>
             </a:r>
             <a:r>
-              <a:rPr lang="ko-KR" altLang="en-US" sz="1400" dirty="0" smtClean="0">
+              <a:rPr lang="ko-KR" altLang="en-US" sz="1400" dirty="0">
                 <a:solidFill>
                   <a:schemeClr val="tx1"/>
                 </a:solidFill>
@@ -9213,7 +9237,7 @@
               <a:t>위에는 플레이어가 채워 넣어야 할 도형들이 나열되며</a:t>
             </a:r>
             <a:r>
-              <a:rPr lang="en-US" altLang="ko-KR" sz="1400" dirty="0" smtClean="0">
+              <a:rPr lang="en-US" altLang="ko-KR" sz="1400" dirty="0">
                 <a:solidFill>
                   <a:schemeClr val="tx1"/>
                 </a:solidFill>
@@ -9223,7 +9247,7 @@
               <a:t>, </a:t>
             </a:r>
             <a:r>
-              <a:rPr lang="ko-KR" altLang="en-US" sz="1400" dirty="0" smtClean="0">
+              <a:rPr lang="ko-KR" altLang="en-US" sz="1400" dirty="0">
                 <a:solidFill>
                   <a:schemeClr val="tx1"/>
                 </a:solidFill>
@@ -9233,7 +9257,7 @@
               <a:t>왼쪽부터 순서대로 색을 채워 넣을 수 있다</a:t>
             </a:r>
             <a:r>
-              <a:rPr lang="en-US" altLang="ko-KR" sz="1400" dirty="0" smtClean="0">
+              <a:rPr lang="en-US" altLang="ko-KR" sz="1400" dirty="0">
                 <a:solidFill>
                   <a:schemeClr val="tx1"/>
                 </a:solidFill>
@@ -9243,7 +9267,7 @@
               <a:t>. </a:t>
             </a:r>
             <a:r>
-              <a:rPr lang="ko-KR" altLang="en-US" sz="1400" dirty="0" smtClean="0">
+              <a:rPr lang="ko-KR" altLang="en-US" sz="1400" dirty="0">
                 <a:solidFill>
                   <a:schemeClr val="tx1"/>
                 </a:solidFill>
@@ -9253,7 +9277,7 @@
               <a:t>도형을 마우스로 클릭하고 단축키를 이용해 색을 </a:t>
             </a:r>
             <a:r>
-              <a:rPr lang="ko-KR" altLang="en-US" sz="1400" dirty="0" err="1" smtClean="0">
+              <a:rPr lang="ko-KR" altLang="en-US" sz="1400" dirty="0" err="1">
                 <a:solidFill>
                   <a:schemeClr val="tx1"/>
                 </a:solidFill>
@@ -9263,7 +9287,7 @@
               <a:t>채워야한다</a:t>
             </a:r>
             <a:r>
-              <a:rPr lang="en-US" altLang="ko-KR" sz="1400" dirty="0" smtClean="0">
+              <a:rPr lang="en-US" altLang="ko-KR" sz="1400" dirty="0">
                 <a:solidFill>
                   <a:schemeClr val="tx1"/>
                 </a:solidFill>
@@ -9273,7 +9297,7 @@
               <a:t>. </a:t>
             </a:r>
             <a:r>
-              <a:rPr lang="ko-KR" altLang="en-US" sz="1400" dirty="0" smtClean="0">
+              <a:rPr lang="ko-KR" altLang="en-US" sz="1400" dirty="0">
                 <a:solidFill>
                   <a:schemeClr val="tx1"/>
                 </a:solidFill>
@@ -9283,7 +9307,7 @@
               <a:t>채울 필요가 없는 도형은 스페이스바로 넘어간다</a:t>
             </a:r>
             <a:r>
-              <a:rPr lang="en-US" altLang="ko-KR" sz="1400" dirty="0" smtClean="0">
+              <a:rPr lang="en-US" altLang="ko-KR" sz="1400" dirty="0">
                 <a:solidFill>
                   <a:schemeClr val="tx1"/>
                 </a:solidFill>
@@ -9292,18 +9316,17 @@
               </a:rPr>
               <a:t>.</a:t>
             </a:r>
-            <a:r>
-              <a:rPr lang="en-US" altLang="ko-KR" sz="1400" dirty="0" smtClean="0">
+            <a:br>
+              <a:rPr lang="en-US" altLang="ko-KR" sz="1400" dirty="0">
                 <a:solidFill>
                   <a:schemeClr val="tx1"/>
                 </a:solidFill>
                 <a:latin typeface="KoPub돋움체 Bold" pitchFamily="18" charset="-127"/>
                 <a:ea typeface="KoPub돋움체 Bold"/>
               </a:rPr>
-              <a:t/>
-            </a:r>
+            </a:br>
             <a:br>
-              <a:rPr lang="en-US" altLang="ko-KR" sz="1400" dirty="0" smtClean="0">
+              <a:rPr lang="en-US" altLang="ko-KR" sz="1400" dirty="0">
                 <a:solidFill>
                   <a:schemeClr val="tx1"/>
                 </a:solidFill>
@@ -9312,36 +9335,17 @@
               </a:rPr>
             </a:br>
             <a:r>
-              <a:rPr lang="en-US" altLang="ko-KR" sz="1400" dirty="0" smtClean="0">
+              <a:rPr lang="ko-KR" altLang="en-US" sz="1400" dirty="0">
                 <a:solidFill>
                   <a:schemeClr val="tx1"/>
                 </a:solidFill>
                 <a:latin typeface="KoPub돋움체 Bold" pitchFamily="18" charset="-127"/>
                 <a:ea typeface="KoPub돋움체 Bold"/>
               </a:rPr>
-              <a:t/>
-            </a:r>
-            <a:br>
-              <a:rPr lang="en-US" altLang="ko-KR" sz="1400" dirty="0" smtClean="0">
-                <a:solidFill>
-                  <a:schemeClr val="tx1"/>
-                </a:solidFill>
-                <a:latin typeface="KoPub돋움체 Bold" pitchFamily="18" charset="-127"/>
-                <a:ea typeface="KoPub돋움체 Bold"/>
-              </a:rPr>
-            </a:br>
-            <a:r>
-              <a:rPr lang="ko-KR" altLang="en-US" sz="1400" dirty="0" smtClean="0">
-                <a:solidFill>
-                  <a:schemeClr val="tx1"/>
-                </a:solidFill>
-                <a:latin typeface="KoPub돋움체 Bold" pitchFamily="18" charset="-127"/>
-                <a:ea typeface="KoPub돋움체 Bold"/>
-              </a:rPr>
               <a:t>사용하는 단축키 </a:t>
             </a:r>
             <a:r>
-              <a:rPr lang="en-US" altLang="ko-KR" sz="1400" dirty="0" smtClean="0">
+              <a:rPr lang="en-US" altLang="ko-KR" sz="1400" dirty="0">
                 <a:solidFill>
                   <a:schemeClr val="tx1"/>
                 </a:solidFill>
@@ -9372,7 +9376,7 @@
               </a:lnSpc>
             </a:pPr>
             <a:r>
-              <a:rPr lang="ko-KR" altLang="en-US" sz="1400" dirty="0" smtClean="0">
+              <a:rPr lang="ko-KR" altLang="en-US" sz="1400" dirty="0">
                 <a:solidFill>
                   <a:schemeClr val="tx1"/>
                 </a:solidFill>
@@ -9382,7 +9386,7 @@
               <a:t>기획의도</a:t>
             </a:r>
             <a:r>
-              <a:rPr lang="en-US" altLang="ko-KR" sz="1400" dirty="0" smtClean="0">
+              <a:rPr lang="en-US" altLang="ko-KR" sz="1400" dirty="0">
                 <a:solidFill>
                   <a:schemeClr val="tx1"/>
                 </a:solidFill>
@@ -9392,7 +9396,7 @@
               <a:t>: </a:t>
             </a:r>
             <a:r>
-              <a:rPr lang="ko-KR" altLang="en-US" sz="1400" dirty="0" smtClean="0">
+              <a:rPr lang="ko-KR" altLang="en-US" sz="1400" dirty="0">
                 <a:solidFill>
                   <a:schemeClr val="tx1"/>
                 </a:solidFill>
@@ -9402,7 +9406,7 @@
               <a:t>플레이어가 주어진 도형과 똑같이 복제할 수 있는지 기획</a:t>
             </a:r>
             <a:r>
-              <a:rPr lang="en-US" altLang="ko-KR" sz="1400" dirty="0" smtClean="0">
+              <a:rPr lang="en-US" altLang="ko-KR" sz="1400" dirty="0">
                 <a:solidFill>
                   <a:schemeClr val="tx1"/>
                 </a:solidFill>
@@ -9455,13 +9459,6 @@
   <p:clrMapOvr>
     <a:masterClrMapping/>
   </p:clrMapOvr>
-  <p:timing>
-    <p:tnLst>
-      <p:par>
-        <p:cTn id="1" dur="indefinite" restart="never" nodeType="tmRoot"/>
-      </p:par>
-    </p:tnLst>
-  </p:timing>
 </p:sld>
 </file>
 
@@ -9616,7 +9613,7 @@
           <a:p>
             <a:pPr algn="ctr"/>
             <a:r>
-              <a:rPr lang="en-US" altLang="ko-KR" sz="2400" dirty="0" smtClean="0">
+              <a:rPr lang="en-US" altLang="ko-KR" sz="2400" dirty="0">
                 <a:solidFill>
                   <a:schemeClr val="bg1"/>
                 </a:solidFill>
@@ -9658,7 +9655,7 @@
           <a:lstStyle/>
           <a:p>
             <a:r>
-              <a:rPr lang="ko-KR" altLang="en-US" sz="2000" b="1" spc="-150" dirty="0" smtClean="0">
+              <a:rPr lang="ko-KR" altLang="en-US" sz="2000" b="1" spc="-150" dirty="0">
                 <a:solidFill>
                   <a:schemeClr val="tx2">
                     <a:lumMod val="75000"/>
@@ -9670,7 +9667,7 @@
               <a:t>미니게임 </a:t>
             </a:r>
             <a:r>
-              <a:rPr lang="en-US" altLang="ko-KR" sz="2000" b="1" spc="-150" dirty="0" smtClean="0">
+              <a:rPr lang="en-US" altLang="ko-KR" sz="2000" b="1" spc="-150" dirty="0">
                 <a:solidFill>
                   <a:schemeClr val="tx2">
                     <a:lumMod val="75000"/>
@@ -9682,7 +9679,7 @@
               <a:t>– </a:t>
             </a:r>
             <a:r>
-              <a:rPr lang="ko-KR" altLang="en-US" sz="2000" b="1" spc="-150" dirty="0" err="1" smtClean="0">
+              <a:rPr lang="ko-KR" altLang="en-US" sz="2000" b="1" spc="-150" dirty="0" err="1">
                 <a:solidFill>
                   <a:schemeClr val="tx2">
                     <a:lumMod val="75000"/>
@@ -9694,7 +9691,7 @@
               <a:t>색채우기</a:t>
             </a:r>
             <a:r>
-              <a:rPr lang="ko-KR" altLang="en-US" sz="2000" b="1" spc="-150" dirty="0" smtClean="0">
+              <a:rPr lang="ko-KR" altLang="en-US" sz="2000" b="1" spc="-150" dirty="0">
                 <a:solidFill>
                   <a:schemeClr val="tx2">
                     <a:lumMod val="75000"/>
@@ -9705,15 +9702,6 @@
               </a:rPr>
               <a:t> 화면</a:t>
             </a:r>
-            <a:endParaRPr lang="ko-KR" altLang="en-US" sz="2000" b="1" spc="-150" dirty="0">
-              <a:solidFill>
-                <a:schemeClr val="tx2">
-                  <a:lumMod val="75000"/>
-                </a:schemeClr>
-              </a:solidFill>
-              <a:latin typeface="KoPub돋움체 Bold" panose="02030600000101010101" pitchFamily="18" charset="-127"/>
-              <a:ea typeface="KoPub돋움체 Bold" panose="02030600000101010101" pitchFamily="18" charset="-127"/>
-            </a:endParaRPr>
           </a:p>
         </p:txBody>
       </p:sp>
@@ -9793,23 +9781,19 @@
           <a:p>
             <a:pPr algn="ctr"/>
             <a:r>
-              <a:rPr lang="ko-KR" altLang="en-US" sz="1600" b="1" spc="-150" dirty="0" err="1" smtClean="0">
+              <a:rPr lang="ko-KR" altLang="en-US" sz="1600" b="1" spc="-150" dirty="0" err="1">
                 <a:latin typeface="KoPub돋움체 Bold" pitchFamily="18" charset="-127"/>
                 <a:ea typeface="KoPub돋움체 Bold" pitchFamily="18" charset="-127"/>
               </a:rPr>
               <a:t>색채우기</a:t>
             </a:r>
             <a:r>
-              <a:rPr lang="ko-KR" altLang="en-US" sz="1600" b="1" spc="-150" dirty="0" smtClean="0">
+              <a:rPr lang="ko-KR" altLang="en-US" sz="1600" b="1" spc="-150" dirty="0">
                 <a:latin typeface="KoPub돋움체 Bold" pitchFamily="18" charset="-127"/>
                 <a:ea typeface="KoPub돋움체 Bold" pitchFamily="18" charset="-127"/>
               </a:rPr>
               <a:t> 임시 화면</a:t>
             </a:r>
-            <a:endParaRPr lang="ko-KR" altLang="en-US" sz="1600" b="1" spc="-150" dirty="0">
-              <a:latin typeface="KoPub돋움체 Bold" pitchFamily="18" charset="-127"/>
-              <a:ea typeface="KoPub돋움체 Bold" pitchFamily="18" charset="-127"/>
-            </a:endParaRPr>
           </a:p>
         </p:txBody>
       </p:sp>
@@ -9847,13 +9831,6 @@
   <p:clrMapOvr>
     <a:masterClrMapping/>
   </p:clrMapOvr>
-  <p:timing>
-    <p:tnLst>
-      <p:par>
-        <p:cTn id="1" dur="indefinite" restart="never" nodeType="tmRoot"/>
-      </p:par>
-    </p:tnLst>
-  </p:timing>
 </p:sld>
 </file>
 
@@ -10008,7 +9985,7 @@
           <a:p>
             <a:pPr algn="ctr"/>
             <a:r>
-              <a:rPr lang="en-US" altLang="ko-KR" sz="2400" dirty="0" smtClean="0">
+              <a:rPr lang="en-US" altLang="ko-KR" sz="2400" dirty="0">
                 <a:solidFill>
                   <a:schemeClr val="bg1"/>
                 </a:solidFill>
@@ -10050,7 +10027,7 @@
           <a:lstStyle/>
           <a:p>
             <a:r>
-              <a:rPr lang="ko-KR" altLang="en-US" sz="2000" b="1" spc="-150" dirty="0" smtClean="0">
+              <a:rPr lang="ko-KR" altLang="en-US" sz="2000" b="1" spc="-150" dirty="0">
                 <a:solidFill>
                   <a:schemeClr val="tx2">
                     <a:lumMod val="75000"/>
@@ -10062,7 +10039,7 @@
               <a:t>미니게임 </a:t>
             </a:r>
             <a:r>
-              <a:rPr lang="en-US" altLang="ko-KR" sz="2000" b="1" spc="-150" dirty="0" smtClean="0">
+              <a:rPr lang="en-US" altLang="ko-KR" sz="2000" b="1" spc="-150" dirty="0">
                 <a:solidFill>
                   <a:schemeClr val="tx2">
                     <a:lumMod val="75000"/>
@@ -10074,7 +10051,7 @@
               <a:t>– </a:t>
             </a:r>
             <a:r>
-              <a:rPr lang="ko-KR" altLang="en-US" sz="2000" b="1" spc="-150" dirty="0" smtClean="0">
+              <a:rPr lang="ko-KR" altLang="en-US" sz="2000" b="1" spc="-150" dirty="0">
                 <a:solidFill>
                   <a:schemeClr val="tx2">
                     <a:lumMod val="75000"/>
@@ -10085,15 +10062,6 @@
               </a:rPr>
               <a:t>꼼꼼히 색칠하기</a:t>
             </a:r>
-            <a:endParaRPr lang="ko-KR" altLang="en-US" sz="2000" b="1" spc="-150" dirty="0">
-              <a:solidFill>
-                <a:schemeClr val="tx2">
-                  <a:lumMod val="75000"/>
-                </a:schemeClr>
-              </a:solidFill>
-              <a:latin typeface="KoPub돋움체 Bold" panose="02030600000101010101" pitchFamily="18" charset="-127"/>
-              <a:ea typeface="KoPub돋움체 Bold" panose="02030600000101010101" pitchFamily="18" charset="-127"/>
-            </a:endParaRPr>
           </a:p>
         </p:txBody>
       </p:sp>
@@ -10146,7 +10114,7 @@
               </a:lnSpc>
             </a:pPr>
             <a:r>
-              <a:rPr lang="ko-KR" altLang="en-US" sz="1400" dirty="0" smtClean="0">
+              <a:rPr lang="ko-KR" altLang="en-US" sz="1400" dirty="0">
                 <a:solidFill>
                   <a:schemeClr val="tx1"/>
                 </a:solidFill>
@@ -10156,7 +10124,7 @@
               <a:t>미로에 있는 미니게임 벽에서 나오는 퍼즐 중에 한가지다</a:t>
             </a:r>
             <a:r>
-              <a:rPr lang="en-US" altLang="ko-KR" sz="1400" dirty="0" smtClean="0">
+              <a:rPr lang="en-US" altLang="ko-KR" sz="1400" dirty="0">
                 <a:solidFill>
                   <a:schemeClr val="tx1"/>
                 </a:solidFill>
@@ -10166,7 +10134,7 @@
               <a:t>. </a:t>
             </a:r>
             <a:r>
-              <a:rPr lang="ko-KR" altLang="en-US" sz="1400" dirty="0" smtClean="0">
+              <a:rPr lang="ko-KR" altLang="en-US" sz="1400" dirty="0">
                 <a:solidFill>
                   <a:schemeClr val="tx1"/>
                 </a:solidFill>
@@ -10176,7 +10144,7 @@
               <a:t>미니게임이 시작하면 </a:t>
             </a:r>
             <a:r>
-              <a:rPr lang="ko-KR" altLang="en-US" sz="1400" dirty="0" err="1" smtClean="0">
+              <a:rPr lang="ko-KR" altLang="en-US" sz="1400" dirty="0" err="1">
                 <a:solidFill>
                   <a:schemeClr val="tx1"/>
                 </a:solidFill>
@@ -10186,7 +10154,7 @@
               <a:t>랜덤하게</a:t>
             </a:r>
             <a:r>
-              <a:rPr lang="ko-KR" altLang="en-US" sz="1400" dirty="0" smtClean="0">
+              <a:rPr lang="ko-KR" altLang="en-US" sz="1400" dirty="0">
                 <a:solidFill>
                   <a:schemeClr val="tx1"/>
                 </a:solidFill>
@@ -10196,7 +10164,7 @@
               <a:t> 색칠공부 도안이 나오고 플레이어는 </a:t>
             </a:r>
             <a:r>
-              <a:rPr lang="ko-KR" altLang="en-US" sz="1400" dirty="0" err="1" smtClean="0">
+              <a:rPr lang="ko-KR" altLang="en-US" sz="1400" dirty="0" err="1">
                 <a:solidFill>
                   <a:schemeClr val="tx1"/>
                 </a:solidFill>
@@ -10206,7 +10174,7 @@
               <a:t>브러쉬를</a:t>
             </a:r>
             <a:r>
-              <a:rPr lang="ko-KR" altLang="en-US" sz="1400" dirty="0" smtClean="0">
+              <a:rPr lang="ko-KR" altLang="en-US" sz="1400" dirty="0">
                 <a:solidFill>
                   <a:schemeClr val="tx1"/>
                 </a:solidFill>
@@ -10216,7 +10184,7 @@
               <a:t> 이용해 해당 그림을 색칠해야 한다</a:t>
             </a:r>
             <a:r>
-              <a:rPr lang="en-US" altLang="ko-KR" sz="1400" dirty="0" smtClean="0">
+              <a:rPr lang="en-US" altLang="ko-KR" sz="1400" dirty="0">
                 <a:solidFill>
                   <a:schemeClr val="tx1"/>
                 </a:solidFill>
@@ -10226,7 +10194,7 @@
               <a:t>. </a:t>
             </a:r>
             <a:r>
-              <a:rPr lang="ko-KR" altLang="en-US" sz="1400" dirty="0" smtClean="0">
+              <a:rPr lang="ko-KR" altLang="en-US" sz="1400" dirty="0">
                 <a:solidFill>
                   <a:schemeClr val="tx1"/>
                 </a:solidFill>
@@ -10236,7 +10204,7 @@
               <a:t>컬러는 정해져 있으며 완성도에만 신경을 써야한다</a:t>
             </a:r>
             <a:r>
-              <a:rPr lang="en-US" altLang="ko-KR" sz="1400" dirty="0" smtClean="0">
+              <a:rPr lang="en-US" altLang="ko-KR" sz="1400" dirty="0">
                 <a:solidFill>
                   <a:schemeClr val="tx1"/>
                 </a:solidFill>
@@ -10246,7 +10214,7 @@
               <a:t>. </a:t>
             </a:r>
             <a:r>
-              <a:rPr lang="ko-KR" altLang="en-US" sz="1400" dirty="0" smtClean="0">
+              <a:rPr lang="ko-KR" altLang="en-US" sz="1400" dirty="0">
                 <a:solidFill>
                   <a:schemeClr val="tx1"/>
                 </a:solidFill>
@@ -10256,7 +10224,7 @@
               <a:t>완성도 </a:t>
             </a:r>
             <a:r>
-              <a:rPr lang="en-US" altLang="ko-KR" sz="1400" dirty="0" smtClean="0">
+              <a:rPr lang="en-US" altLang="ko-KR" sz="1400" dirty="0">
                 <a:solidFill>
                   <a:schemeClr val="tx1"/>
                 </a:solidFill>
@@ -10266,7 +10234,7 @@
               <a:t>90%</a:t>
             </a:r>
             <a:r>
-              <a:rPr lang="ko-KR" altLang="en-US" sz="1400" dirty="0" smtClean="0">
+              <a:rPr lang="ko-KR" altLang="en-US" sz="1400" dirty="0">
                 <a:solidFill>
                   <a:schemeClr val="tx1"/>
                 </a:solidFill>
@@ -10276,7 +10244,7 @@
               <a:t>에 달하면 </a:t>
             </a:r>
             <a:r>
-              <a:rPr lang="ko-KR" altLang="en-US" sz="1400" dirty="0" err="1" smtClean="0">
+              <a:rPr lang="ko-KR" altLang="en-US" sz="1400" dirty="0" err="1">
                 <a:solidFill>
                   <a:schemeClr val="tx1"/>
                 </a:solidFill>
@@ -10286,7 +10254,7 @@
               <a:t>클리어</a:t>
             </a:r>
             <a:r>
-              <a:rPr lang="ko-KR" altLang="en-US" sz="1400" dirty="0" smtClean="0">
+              <a:rPr lang="ko-KR" altLang="en-US" sz="1400" dirty="0">
                 <a:solidFill>
                   <a:schemeClr val="tx1"/>
                 </a:solidFill>
@@ -10296,7 +10264,7 @@
               <a:t> 가능</a:t>
             </a:r>
             <a:r>
-              <a:rPr lang="en-US" altLang="ko-KR" sz="1400" dirty="0" smtClean="0">
+              <a:rPr lang="en-US" altLang="ko-KR" sz="1400" dirty="0">
                 <a:solidFill>
                   <a:schemeClr val="tx1"/>
                 </a:solidFill>
@@ -10306,7 +10274,7 @@
               <a:t>.</a:t>
             </a:r>
             <a:br>
-              <a:rPr lang="en-US" altLang="ko-KR" sz="1400" dirty="0" smtClean="0">
+              <a:rPr lang="en-US" altLang="ko-KR" sz="1400" dirty="0">
                 <a:solidFill>
                   <a:schemeClr val="tx1"/>
                 </a:solidFill>
@@ -10314,87 +10282,77 @@
                 <a:ea typeface="KoPub돋움체 Bold"/>
               </a:rPr>
             </a:br>
-            <a:r>
-              <a:rPr lang="en-US" altLang="ko-KR" sz="1400" dirty="0" smtClean="0">
+            <a:br>
+              <a:rPr lang="en-US" altLang="ko-KR" sz="1400" dirty="0">
                 <a:solidFill>
                   <a:schemeClr val="tx1"/>
                 </a:solidFill>
                 <a:latin typeface="KoPub돋움체 Bold" pitchFamily="18" charset="-127"/>
                 <a:ea typeface="KoPub돋움체 Bold"/>
               </a:rPr>
-              <a:t/>
-            </a:r>
-            <a:br>
-              <a:rPr lang="en-US" altLang="ko-KR" sz="1400" dirty="0" smtClean="0">
+            </a:br>
+            <a:r>
+              <a:rPr lang="ko-KR" altLang="en-US" sz="1400" dirty="0">
                 <a:solidFill>
                   <a:schemeClr val="tx1"/>
                 </a:solidFill>
                 <a:latin typeface="KoPub돋움체 Bold" pitchFamily="18" charset="-127"/>
                 <a:ea typeface="KoPub돋움체 Bold"/>
               </a:rPr>
-            </a:br>
-            <a:r>
-              <a:rPr lang="ko-KR" altLang="en-US" sz="1400" dirty="0" smtClean="0">
+              <a:t>사용하는 단축키 </a:t>
+            </a:r>
+            <a:r>
+              <a:rPr lang="en-US" altLang="ko-KR" sz="1400" dirty="0">
                 <a:solidFill>
                   <a:schemeClr val="tx1"/>
                 </a:solidFill>
                 <a:latin typeface="KoPub돋움체 Bold" pitchFamily="18" charset="-127"/>
                 <a:ea typeface="KoPub돋움체 Bold"/>
               </a:rPr>
-              <a:t>사용하는 단축키 </a:t>
-            </a:r>
-            <a:r>
-              <a:rPr lang="en-US" altLang="ko-KR" sz="1400" dirty="0" smtClean="0">
+              <a:t>: [, ] (</a:t>
+            </a:r>
+            <a:r>
+              <a:rPr lang="ko-KR" altLang="en-US" sz="1400" dirty="0" err="1">
                 <a:solidFill>
                   <a:schemeClr val="tx1"/>
                 </a:solidFill>
                 <a:latin typeface="KoPub돋움체 Bold" pitchFamily="18" charset="-127"/>
                 <a:ea typeface="KoPub돋움체 Bold"/>
               </a:rPr>
-              <a:t>: [, ] (</a:t>
-            </a:r>
-            <a:r>
-              <a:rPr lang="ko-KR" altLang="en-US" sz="1400" dirty="0" err="1" smtClean="0">
+              <a:t>브러쉬</a:t>
+            </a:r>
+            <a:r>
+              <a:rPr lang="ko-KR" altLang="en-US" sz="1400" dirty="0">
                 <a:solidFill>
                   <a:schemeClr val="tx1"/>
                 </a:solidFill>
                 <a:latin typeface="KoPub돋움체 Bold" pitchFamily="18" charset="-127"/>
                 <a:ea typeface="KoPub돋움체 Bold"/>
               </a:rPr>
-              <a:t>브러쉬</a:t>
-            </a:r>
-            <a:r>
-              <a:rPr lang="ko-KR" altLang="en-US" sz="1400" dirty="0" smtClean="0">
+              <a:t> 크기 조정</a:t>
+            </a:r>
+            <a:r>
+              <a:rPr lang="en-US" altLang="ko-KR" sz="1400" dirty="0">
                 <a:solidFill>
                   <a:schemeClr val="tx1"/>
                 </a:solidFill>
                 <a:latin typeface="KoPub돋움체 Bold" pitchFamily="18" charset="-127"/>
                 <a:ea typeface="KoPub돋움체 Bold"/>
               </a:rPr>
-              <a:t> 크기 조정</a:t>
-            </a:r>
-            <a:r>
-              <a:rPr lang="en-US" altLang="ko-KR" sz="1400" dirty="0" smtClean="0">
+              <a:t>), E (</a:t>
+            </a:r>
+            <a:r>
+              <a:rPr lang="ko-KR" altLang="en-US" sz="1400" dirty="0">
                 <a:solidFill>
                   <a:schemeClr val="tx1"/>
                 </a:solidFill>
                 <a:latin typeface="KoPub돋움체 Bold" pitchFamily="18" charset="-127"/>
                 <a:ea typeface="KoPub돋움체 Bold"/>
               </a:rPr>
-              <a:t>), E (</a:t>
-            </a:r>
-            <a:r>
-              <a:rPr lang="ko-KR" altLang="en-US" sz="1400" dirty="0" smtClean="0">
-                <a:solidFill>
-                  <a:schemeClr val="tx1"/>
-                </a:solidFill>
-                <a:latin typeface="KoPub돋움체 Bold" pitchFamily="18" charset="-127"/>
-                <a:ea typeface="KoPub돋움체 Bold"/>
-              </a:rPr>
               <a:t>지우개 단축키</a:t>
             </a:r>
             <a:r>
-              <a:rPr lang="en-US" altLang="ko-KR" sz="1400" dirty="0" smtClean="0">
+              <a:rPr lang="en-US" altLang="ko-KR" sz="1400" dirty="0">
                 <a:solidFill>
                   <a:schemeClr val="tx1"/>
                 </a:solidFill>
@@ -10425,7 +10383,7 @@
               </a:lnSpc>
             </a:pPr>
             <a:r>
-              <a:rPr lang="ko-KR" altLang="en-US" sz="1400" dirty="0" smtClean="0">
+              <a:rPr lang="ko-KR" altLang="en-US" sz="1400" dirty="0">
                 <a:solidFill>
                   <a:schemeClr val="tx1"/>
                 </a:solidFill>
@@ -10435,7 +10393,7 @@
               <a:t>기획의도</a:t>
             </a:r>
             <a:r>
-              <a:rPr lang="en-US" altLang="ko-KR" sz="1400" dirty="0" smtClean="0">
+              <a:rPr lang="en-US" altLang="ko-KR" sz="1400" dirty="0">
                 <a:solidFill>
                   <a:schemeClr val="tx1"/>
                 </a:solidFill>
@@ -10445,7 +10403,7 @@
               <a:t>: </a:t>
             </a:r>
             <a:r>
-              <a:rPr lang="ko-KR" altLang="en-US" sz="1400" dirty="0" smtClean="0">
+              <a:rPr lang="ko-KR" altLang="en-US" sz="1400" dirty="0">
                 <a:solidFill>
                   <a:schemeClr val="tx1"/>
                 </a:solidFill>
@@ -10455,7 +10413,7 @@
               <a:t>플레이어가 </a:t>
             </a:r>
             <a:r>
-              <a:rPr lang="ko-KR" altLang="en-US" sz="1400" dirty="0" err="1" smtClean="0">
+              <a:rPr lang="ko-KR" altLang="en-US" sz="1400" dirty="0" err="1">
                 <a:solidFill>
                   <a:schemeClr val="tx1"/>
                 </a:solidFill>
@@ -10465,7 +10423,7 @@
               <a:t>브러쉬</a:t>
             </a:r>
             <a:r>
-              <a:rPr lang="ko-KR" altLang="en-US" sz="1400" dirty="0" smtClean="0">
+              <a:rPr lang="ko-KR" altLang="en-US" sz="1400" dirty="0">
                 <a:solidFill>
                   <a:schemeClr val="tx1"/>
                 </a:solidFill>
@@ -10475,7 +10433,7 @@
               <a:t> 크기를 조정하면서 얼마나 꼼꼼하게 색칠 할 수 있는지 기획</a:t>
             </a:r>
             <a:r>
-              <a:rPr lang="en-US" altLang="ko-KR" sz="1400" dirty="0" smtClean="0">
+              <a:rPr lang="en-US" altLang="ko-KR" sz="1400" dirty="0">
                 <a:solidFill>
                   <a:schemeClr val="tx1"/>
                 </a:solidFill>
@@ -10542,16 +10500,12 @@
           <a:p>
             <a:pPr algn="ctr"/>
             <a:r>
-              <a:rPr lang="ko-KR" altLang="en-US" sz="1600" b="1" spc="-150" dirty="0" smtClean="0">
+              <a:rPr lang="ko-KR" altLang="en-US" sz="1600" b="1" spc="-150" dirty="0">
                 <a:latin typeface="KoPub돋움체 Bold" pitchFamily="18" charset="-127"/>
                 <a:ea typeface="KoPub돋움체 Bold" pitchFamily="18" charset="-127"/>
               </a:rPr>
               <a:t>꼼꼼히 색칠하기 도안</a:t>
             </a:r>
-            <a:endParaRPr lang="ko-KR" altLang="en-US" sz="1600" b="1" spc="-150" dirty="0">
-              <a:latin typeface="KoPub돋움체 Bold" pitchFamily="18" charset="-127"/>
-              <a:ea typeface="KoPub돋움체 Bold" pitchFamily="18" charset="-127"/>
-            </a:endParaRPr>
           </a:p>
         </p:txBody>
       </p:sp>
@@ -10565,13 +10519,6 @@
   <p:clrMapOvr>
     <a:masterClrMapping/>
   </p:clrMapOvr>
-  <p:timing>
-    <p:tnLst>
-      <p:par>
-        <p:cTn id="1" dur="indefinite" restart="never" nodeType="tmRoot"/>
-      </p:par>
-    </p:tnLst>
-  </p:timing>
 </p:sld>
 </file>
 
@@ -10726,7 +10673,7 @@
           <a:p>
             <a:pPr algn="ctr"/>
             <a:r>
-              <a:rPr lang="en-US" altLang="ko-KR" sz="2400" dirty="0" smtClean="0">
+              <a:rPr lang="en-US" altLang="ko-KR" sz="2400" dirty="0">
                 <a:solidFill>
                   <a:schemeClr val="bg1"/>
                 </a:solidFill>
@@ -10768,7 +10715,7 @@
           <a:lstStyle/>
           <a:p>
             <a:r>
-              <a:rPr lang="ko-KR" altLang="en-US" sz="2000" b="1" spc="-150" dirty="0" smtClean="0">
+              <a:rPr lang="ko-KR" altLang="en-US" sz="2000" b="1" spc="-150" dirty="0">
                 <a:solidFill>
                   <a:schemeClr val="tx2">
                     <a:lumMod val="75000"/>
@@ -10780,7 +10727,7 @@
               <a:t>미니게임 </a:t>
             </a:r>
             <a:r>
-              <a:rPr lang="en-US" altLang="ko-KR" sz="2000" b="1" spc="-150" dirty="0" smtClean="0">
+              <a:rPr lang="en-US" altLang="ko-KR" sz="2000" b="1" spc="-150" dirty="0">
                 <a:solidFill>
                   <a:schemeClr val="tx2">
                     <a:lumMod val="75000"/>
@@ -10792,7 +10739,7 @@
               <a:t>– </a:t>
             </a:r>
             <a:r>
-              <a:rPr lang="ko-KR" altLang="en-US" sz="2000" b="1" spc="-150" dirty="0" smtClean="0">
+              <a:rPr lang="ko-KR" altLang="en-US" sz="2000" b="1" spc="-150" dirty="0">
                 <a:solidFill>
                   <a:schemeClr val="tx2">
                     <a:lumMod val="75000"/>
@@ -10803,15 +10750,6 @@
               </a:rPr>
               <a:t>꼼꼼히 색칠하기 화면</a:t>
             </a:r>
-            <a:endParaRPr lang="ko-KR" altLang="en-US" sz="2000" b="1" spc="-150" dirty="0">
-              <a:solidFill>
-                <a:schemeClr val="tx2">
-                  <a:lumMod val="75000"/>
-                </a:schemeClr>
-              </a:solidFill>
-              <a:latin typeface="KoPub돋움체 Bold" panose="02030600000101010101" pitchFamily="18" charset="-127"/>
-              <a:ea typeface="KoPub돋움체 Bold" panose="02030600000101010101" pitchFamily="18" charset="-127"/>
-            </a:endParaRPr>
           </a:p>
         </p:txBody>
       </p:sp>
@@ -10891,23 +10829,19 @@
           <a:p>
             <a:pPr algn="ctr"/>
             <a:r>
-              <a:rPr lang="ko-KR" altLang="en-US" sz="1600" b="1" spc="-150" smtClean="0">
+              <a:rPr lang="ko-KR" altLang="en-US" sz="1600" b="1" spc="-150">
                 <a:latin typeface="KoPub돋움체 Bold" pitchFamily="18" charset="-127"/>
                 <a:ea typeface="KoPub돋움체 Bold" pitchFamily="18" charset="-127"/>
               </a:rPr>
               <a:t>꼼꼼히 색칠하기 </a:t>
             </a:r>
             <a:r>
-              <a:rPr lang="ko-KR" altLang="en-US" sz="1600" b="1" spc="-150" dirty="0" smtClean="0">
+              <a:rPr lang="ko-KR" altLang="en-US" sz="1600" b="1" spc="-150" dirty="0">
                 <a:latin typeface="KoPub돋움체 Bold" pitchFamily="18" charset="-127"/>
                 <a:ea typeface="KoPub돋움체 Bold" pitchFamily="18" charset="-127"/>
               </a:rPr>
               <a:t>임시 화면</a:t>
             </a:r>
-            <a:endParaRPr lang="ko-KR" altLang="en-US" sz="1600" b="1" spc="-150" dirty="0">
-              <a:latin typeface="KoPub돋움체 Bold" pitchFamily="18" charset="-127"/>
-              <a:ea typeface="KoPub돋움체 Bold" pitchFamily="18" charset="-127"/>
-            </a:endParaRPr>
           </a:p>
         </p:txBody>
       </p:sp>
@@ -10997,17 +10931,10 @@
   <p:clrMapOvr>
     <a:masterClrMapping/>
   </p:clrMapOvr>
-  <p:timing>
-    <p:tnLst>
-      <p:par>
-        <p:cTn id="1" dur="indefinite" restart="never" nodeType="tmRoot"/>
-      </p:par>
-    </p:tnLst>
-  </p:timing>
 </p:sld>
 </file>
 
-<file path=ppt/slides/slide2.xml><?xml version="1.0" encoding="utf-8"?>
+<file path=ppt/slides/slide18.xml><?xml version="1.0" encoding="utf-8"?>
 <p:sld xmlns:a="http://schemas.openxmlformats.org/drawingml/2006/main" xmlns:r="http://schemas.openxmlformats.org/officeDocument/2006/relationships" xmlns:p="http://schemas.openxmlformats.org/presentationml/2006/main">
   <p:cSld>
     <p:bg>
@@ -11075,24 +11002,10 @@
           <a:bodyPr rtlCol="0" anchor="ctr"/>
           <a:lstStyle/>
           <a:p>
-            <a:endParaRPr lang="ko-KR" altLang="en-US" dirty="0" smtClean="0">
-              <a:solidFill>
-                <a:schemeClr val="tx1"/>
-              </a:solidFill>
-              <a:latin typeface="KoPub돋움체 Bold" pitchFamily="18" charset="-127"/>
-              <a:ea typeface="KoPub돋움체 Bold"/>
-            </a:endParaRPr>
-          </a:p>
-          <a:p>
-            <a:pPr marL="342900" indent="-342900">
-              <a:buAutoNum type="arabicPeriod"/>
-            </a:pPr>
-            <a:endParaRPr lang="ko-KR" altLang="en-US" dirty="0">
-              <a:solidFill>
-                <a:schemeClr val="tx1"/>
-              </a:solidFill>
-              <a:latin typeface="KoPub돋움체 Bold" pitchFamily="18" charset="-127"/>
-              <a:ea typeface="KoPub돋움체 Bold"/>
+            <a:pPr algn="ctr"/>
+            <a:endParaRPr lang="ko-KR" altLang="en-US">
+              <a:latin typeface="KoPub돋움체 Bold" panose="02030600000101010101" pitchFamily="18" charset="-127"/>
+              <a:ea typeface="KoPub돋움체 Bold" panose="02030600000101010101" pitchFamily="18" charset="-127"/>
             </a:endParaRPr>
           </a:p>
         </p:txBody>
@@ -11142,8 +11055,8 @@
           <a:p>
             <a:pPr algn="ctr"/>
             <a:endParaRPr lang="ko-KR" altLang="en-US">
-              <a:latin typeface="KoPub돋움체 Bold" pitchFamily="18" charset="-127"/>
-              <a:ea typeface="KoPub돋움체 Bold"/>
+              <a:latin typeface="KoPub돋움체 Bold" panose="02030600000101010101" pitchFamily="18" charset="-127"/>
+              <a:ea typeface="KoPub돋움체 Bold" panose="02030600000101010101" pitchFamily="18" charset="-127"/>
             </a:endParaRPr>
           </a:p>
         </p:txBody>
@@ -11176,17 +11089,17 @@
                 <a:solidFill>
                   <a:schemeClr val="bg1"/>
                 </a:solidFill>
-                <a:latin typeface="KoPub돋움체 Bold" pitchFamily="18" charset="-127"/>
-                <a:ea typeface="KoPub돋움체 Bold"/>
-              </a:rPr>
-              <a:t>01</a:t>
+                <a:latin typeface="KoPub돋움체 Bold" panose="02030600000101010101" pitchFamily="18" charset="-127"/>
+                <a:ea typeface="KoPub돋움체 Bold" panose="02030600000101010101" pitchFamily="18" charset="-127"/>
+              </a:rPr>
+              <a:t>17</a:t>
             </a:r>
             <a:endParaRPr lang="ko-KR" altLang="en-US" sz="2400" dirty="0">
               <a:solidFill>
                 <a:schemeClr val="bg1"/>
               </a:solidFill>
-              <a:latin typeface="KoPub돋움체 Bold" pitchFamily="18" charset="-127"/>
-              <a:ea typeface="KoPub돋움체 Bold"/>
+              <a:latin typeface="KoPub돋움체 Bold" panose="02030600000101010101" pitchFamily="18" charset="-127"/>
+              <a:ea typeface="KoPub돋움체 Bold" panose="02030600000101010101" pitchFamily="18" charset="-127"/>
             </a:endParaRPr>
           </a:p>
         </p:txBody>
@@ -11200,7 +11113,7 @@
         <p:spPr>
           <a:xfrm>
             <a:off x="427435" y="836712"/>
-            <a:ext cx="1192237" cy="1015663"/>
+            <a:ext cx="3208461" cy="400110"/>
           </a:xfrm>
           <a:prstGeom prst="rect">
             <a:avLst/>
@@ -11214,50 +11127,106 @@
           <a:lstStyle/>
           <a:p>
             <a:r>
-              <a:rPr lang="ko-KR" altLang="en-US" sz="3600" b="1" spc="-150" dirty="0" smtClean="0">
+              <a:rPr lang="ko-KR" altLang="en-US" sz="2000" b="1" spc="-150" dirty="0">
                 <a:solidFill>
                   <a:schemeClr val="tx2">
                     <a:lumMod val="75000"/>
                   </a:schemeClr>
                 </a:solidFill>
-                <a:latin typeface="KoPub돋움체 Bold" pitchFamily="18" charset="-127"/>
-                <a:ea typeface="KoPub돋움체 Bold"/>
-              </a:rPr>
-              <a:t>목차</a:t>
-            </a:r>
-            <a:endParaRPr lang="ko-KR" altLang="en-US" sz="3600" b="1" spc="-150" dirty="0">
-              <a:solidFill>
-                <a:schemeClr val="tx2">
-                  <a:lumMod val="75000"/>
-                </a:schemeClr>
-              </a:solidFill>
-              <a:latin typeface="KoPub돋움체 Bold" pitchFamily="18" charset="-127"/>
-              <a:ea typeface="KoPub돋움체 Bold"/>
-            </a:endParaRPr>
-          </a:p>
-          <a:p>
-            <a:endParaRPr lang="ko-KR" altLang="en-US" sz="2400" dirty="0">
-              <a:solidFill>
-                <a:schemeClr val="tx2">
-                  <a:lumMod val="75000"/>
-                </a:schemeClr>
-              </a:solidFill>
-              <a:latin typeface="KoPub돋움체 Bold" pitchFamily="18" charset="-127"/>
-              <a:ea typeface="KoPub돋움체 Bold"/>
-            </a:endParaRPr>
-          </a:p>
-        </p:txBody>
-      </p:sp>
-      <p:sp>
-        <p:nvSpPr>
-          <p:cNvPr id="4" name="TextBox 3"/>
+                <a:latin typeface="KoPub돋움체 Bold" panose="02030600000101010101" pitchFamily="18" charset="-127"/>
+                <a:ea typeface="KoPub돋움체 Bold" panose="02030600000101010101" pitchFamily="18" charset="-127"/>
+              </a:rPr>
+              <a:t>미니게임 </a:t>
+            </a:r>
+            <a:r>
+              <a:rPr lang="en-US" altLang="ko-KR" sz="2000" b="1" spc="-150" dirty="0">
+                <a:solidFill>
+                  <a:schemeClr val="tx2">
+                    <a:lumMod val="75000"/>
+                  </a:schemeClr>
+                </a:solidFill>
+                <a:latin typeface="KoPub돋움체 Bold" panose="02030600000101010101" pitchFamily="18" charset="-127"/>
+                <a:ea typeface="KoPub돋움체 Bold" panose="02030600000101010101" pitchFamily="18" charset="-127"/>
+              </a:rPr>
+              <a:t>– </a:t>
+            </a:r>
+            <a:r>
+              <a:rPr lang="ko-KR" altLang="en-US" sz="2000" b="1" spc="-150" dirty="0">
+                <a:solidFill>
+                  <a:schemeClr val="tx2">
+                    <a:lumMod val="75000"/>
+                  </a:schemeClr>
+                </a:solidFill>
+                <a:latin typeface="KoPub돋움체 Bold" panose="02030600000101010101" pitchFamily="18" charset="-127"/>
+                <a:ea typeface="KoPub돋움체 Bold" panose="02030600000101010101" pitchFamily="18" charset="-127"/>
+              </a:rPr>
+              <a:t>사본을 만들어보아요</a:t>
+            </a:r>
+          </a:p>
+        </p:txBody>
+      </p:sp>
+      <p:pic>
+        <p:nvPicPr>
+          <p:cNvPr id="7" name="Picture 2" descr="어도비 포토샵 작업화면 안보일 때 해결하는 방법 : 네이버 블로그">
+            <a:extLst>
+              <a:ext uri="{FF2B5EF4-FFF2-40B4-BE49-F238E27FC236}">
+                <a16:creationId xmlns:a16="http://schemas.microsoft.com/office/drawing/2014/main" id="{80A76205-9E26-C9D1-05CB-CDA87FFC424D}"/>
+              </a:ext>
+            </a:extLst>
+          </p:cNvPr>
+          <p:cNvPicPr>
+            <a:picLocks noChangeAspect="1" noChangeArrowheads="1"/>
+          </p:cNvPicPr>
+          <p:nvPr/>
+        </p:nvPicPr>
+        <p:blipFill>
+          <a:blip r:embed="rId3">
+            <a:extLst>
+              <a:ext uri="{28A0092B-C50C-407E-A947-70E740481C1C}">
+                <a14:useLocalDpi xmlns:a14="http://schemas.microsoft.com/office/drawing/2010/main" val="0"/>
+              </a:ext>
+            </a:extLst>
+          </a:blip>
+          <a:srcRect/>
+          <a:stretch>
+            <a:fillRect/>
+          </a:stretch>
+        </p:blipFill>
+        <p:spPr bwMode="auto">
+          <a:xfrm>
+            <a:off x="1115616" y="1777590"/>
+            <a:ext cx="6840760" cy="3882131"/>
+          </a:xfrm>
+          <a:prstGeom prst="rect">
+            <a:avLst/>
+          </a:prstGeom>
+          <a:noFill/>
+          <a:ln w="12700">
+            <a:solidFill>
+              <a:schemeClr val="tx1"/>
+            </a:solidFill>
+          </a:ln>
+          <a:extLst>
+            <a:ext uri="{909E8E84-426E-40DD-AFC4-6F175D3DCCD1}">
+              <a14:hiddenFill xmlns:a14="http://schemas.microsoft.com/office/drawing/2010/main">
+                <a:solidFill>
+                  <a:srgbClr val="FFFFFF"/>
+                </a:solidFill>
+              </a14:hiddenFill>
+            </a:ext>
+          </a:extLst>
+        </p:spPr>
+      </p:pic>
+      <p:sp>
+        <p:nvSpPr>
+          <p:cNvPr id="32" name="TextBox 31"/>
           <p:cNvSpPr txBox="1"/>
           <p:nvPr/>
         </p:nvSpPr>
         <p:spPr>
           <a:xfrm>
-            <a:off x="755576" y="1628800"/>
-            <a:ext cx="4104456" cy="2419124"/>
+            <a:off x="1115616" y="5682734"/>
+            <a:ext cx="2232248" cy="338554"/>
           </a:xfrm>
           <a:prstGeom prst="rect">
             <a:avLst/>
@@ -11270,278 +11239,169 @@
           </a:bodyPr>
           <a:lstStyle/>
           <a:p>
-            <a:pPr marL="457200" lvl="0" indent="-330200">
-              <a:lnSpc>
-                <a:spcPct val="105000"/>
-              </a:lnSpc>
-              <a:buSzPts val="1600"/>
-              <a:buAutoNum type="arabicPeriod"/>
-            </a:pPr>
-            <a:r>
-              <a:rPr lang="ko-KR" altLang="en-US" sz="1600" b="1" dirty="0" smtClean="0">
-                <a:latin typeface="맑은 고딕" panose="020B0503020000020004" pitchFamily="50" charset="-127"/>
-                <a:ea typeface="KoPub돋움체 Bold"/>
-              </a:rPr>
-              <a:t>개요 </a:t>
-            </a:r>
-            <a:r>
-              <a:rPr lang="en-US" altLang="ko-KR" sz="1600" b="1" dirty="0" smtClean="0">
-                <a:latin typeface="맑은 고딕" panose="020B0503020000020004" pitchFamily="50" charset="-127"/>
-                <a:ea typeface="KoPub돋움체 Bold"/>
-              </a:rPr>
-              <a:t>&amp; </a:t>
-            </a:r>
-            <a:r>
-              <a:rPr lang="ko-KR" altLang="en-US" sz="1600" b="1" dirty="0" err="1" smtClean="0">
-                <a:latin typeface="맑은 고딕" panose="020B0503020000020004" pitchFamily="50" charset="-127"/>
-                <a:ea typeface="KoPub돋움체 Bold"/>
-              </a:rPr>
-              <a:t>조작키</a:t>
-            </a:r>
-            <a:endParaRPr lang="en-US" altLang="ko-KR" sz="1600" b="1" dirty="0" smtClean="0">
-              <a:latin typeface="맑은 고딕" panose="020B0503020000020004" pitchFamily="50" charset="-127"/>
-              <a:ea typeface="KoPub돋움체 Bold"/>
+            <a:r>
+              <a:rPr lang="ko-KR" altLang="en-US" sz="1600" b="1" spc="-150" dirty="0">
+                <a:latin typeface="KoPub돋움체 Bold" pitchFamily="18" charset="-127"/>
+                <a:ea typeface="KoPub돋움체 Bold" pitchFamily="18" charset="-127"/>
+              </a:rPr>
+              <a:t>임시 화면 </a:t>
+            </a:r>
+            <a:r>
+              <a:rPr lang="en-US" altLang="ko-KR" sz="1600" b="1" spc="-150" dirty="0">
+                <a:latin typeface="KoPub돋움체 Bold" pitchFamily="18" charset="-127"/>
+                <a:ea typeface="KoPub돋움체 Bold" pitchFamily="18" charset="-127"/>
+              </a:rPr>
+              <a:t>123</a:t>
+            </a:r>
+            <a:endParaRPr lang="ko-KR" altLang="en-US" sz="1600" b="1" spc="-150" dirty="0">
+              <a:latin typeface="KoPub돋움체 Bold" pitchFamily="18" charset="-127"/>
+              <a:ea typeface="KoPub돋움체 Bold" pitchFamily="18" charset="-127"/>
             </a:endParaRPr>
           </a:p>
-          <a:p>
-            <a:pPr marL="457200" lvl="0" indent="-330200">
-              <a:lnSpc>
-                <a:spcPct val="105000"/>
-              </a:lnSpc>
-              <a:buSzPts val="1600"/>
-              <a:buAutoNum type="arabicPeriod"/>
-            </a:pPr>
-            <a:r>
-              <a:rPr lang="ko-KR" altLang="en-US" sz="1600" b="1" dirty="0" smtClean="0">
-                <a:latin typeface="맑은 고딕" panose="020B0503020000020004" pitchFamily="50" charset="-127"/>
-                <a:ea typeface="KoPub돋움체 Bold"/>
-              </a:rPr>
-              <a:t>캐릭터 시야 시스템</a:t>
-            </a:r>
-            <a:endParaRPr lang="en-US" altLang="ko-KR" sz="1600" b="1" dirty="0" smtClean="0">
-              <a:latin typeface="맑은 고딕" panose="020B0503020000020004" pitchFamily="50" charset="-127"/>
-              <a:ea typeface="KoPub돋움체 Bold"/>
-            </a:endParaRPr>
-          </a:p>
-          <a:p>
-            <a:pPr marL="457200" lvl="0" indent="-330200">
-              <a:lnSpc>
-                <a:spcPct val="105000"/>
-              </a:lnSpc>
-              <a:buSzPts val="1600"/>
-              <a:buAutoNum type="arabicPeriod"/>
-            </a:pPr>
-            <a:r>
-              <a:rPr lang="ko-KR" altLang="en-US" sz="1600" b="1" dirty="0" smtClean="0">
-                <a:latin typeface="맑은 고딕" panose="020B0503020000020004" pitchFamily="50" charset="-127"/>
-                <a:ea typeface="KoPub돋움체 Bold"/>
-              </a:rPr>
-              <a:t>단축키 정리</a:t>
-            </a:r>
-            <a:endParaRPr lang="en-US" altLang="ko-KR" sz="1600" b="1" dirty="0" smtClean="0">
-              <a:latin typeface="맑은 고딕" panose="020B0503020000020004" pitchFamily="50" charset="-127"/>
-              <a:ea typeface="KoPub돋움체 Bold"/>
-            </a:endParaRPr>
-          </a:p>
-          <a:p>
-            <a:pPr marL="457200" lvl="0" indent="-330200">
-              <a:lnSpc>
-                <a:spcPct val="105000"/>
-              </a:lnSpc>
-              <a:buSzPts val="1600"/>
-              <a:buAutoNum type="arabicPeriod"/>
-            </a:pPr>
-            <a:r>
-              <a:rPr lang="ko-KR" altLang="en-US" sz="1600" b="1" dirty="0" smtClean="0">
-                <a:latin typeface="맑은 고딕" panose="020B0503020000020004" pitchFamily="50" charset="-127"/>
-                <a:ea typeface="KoPub돋움체 Bold"/>
-              </a:rPr>
-              <a:t>미로 맵 구성</a:t>
-            </a:r>
-            <a:endParaRPr lang="en-US" altLang="ko-KR" sz="1600" b="1" dirty="0" smtClean="0">
-              <a:latin typeface="맑은 고딕" panose="020B0503020000020004" pitchFamily="50" charset="-127"/>
-              <a:ea typeface="KoPub돋움체 Bold"/>
-            </a:endParaRPr>
-          </a:p>
-          <a:p>
-            <a:pPr marL="457200" lvl="0" indent="-330200">
-              <a:lnSpc>
-                <a:spcPct val="105000"/>
-              </a:lnSpc>
-              <a:buSzPts val="1600"/>
-              <a:buAutoNum type="arabicPeriod"/>
-            </a:pPr>
-            <a:r>
-              <a:rPr lang="ko-KR" altLang="en-US" sz="1600" b="1" dirty="0" smtClean="0">
-                <a:latin typeface="맑은 고딕" panose="020B0503020000020004" pitchFamily="50" charset="-127"/>
-                <a:ea typeface="KoPub돋움체 Bold"/>
-              </a:rPr>
-              <a:t>게임 플레이 화면</a:t>
-            </a:r>
-            <a:endParaRPr lang="en-US" altLang="ko-KR" sz="1600" b="1" dirty="0" smtClean="0">
-              <a:latin typeface="맑은 고딕" panose="020B0503020000020004" pitchFamily="50" charset="-127"/>
-              <a:ea typeface="KoPub돋움체 Bold"/>
-            </a:endParaRPr>
-          </a:p>
-          <a:p>
-            <a:pPr marL="457200" lvl="0" indent="-330200">
-              <a:lnSpc>
-                <a:spcPct val="105000"/>
-              </a:lnSpc>
-              <a:buSzPts val="1600"/>
-              <a:buAutoNum type="arabicPeriod"/>
-            </a:pPr>
-            <a:r>
-              <a:rPr lang="ko-KR" altLang="en-US" sz="1600" b="1" dirty="0" smtClean="0">
-                <a:latin typeface="맑은 고딕" panose="020B0503020000020004" pitchFamily="50" charset="-127"/>
-                <a:ea typeface="KoPub돋움체 Bold"/>
-              </a:rPr>
-              <a:t>미니게임 </a:t>
-            </a:r>
-            <a:r>
-              <a:rPr lang="en-US" altLang="ko-KR" sz="1600" b="1" dirty="0" smtClean="0">
-                <a:latin typeface="맑은 고딕" panose="020B0503020000020004" pitchFamily="50" charset="-127"/>
-                <a:ea typeface="KoPub돋움체 Bold"/>
-              </a:rPr>
-              <a:t>– </a:t>
-            </a:r>
-            <a:r>
-              <a:rPr lang="ko-KR" altLang="en-US" sz="1600" b="1" dirty="0" err="1" smtClean="0">
-                <a:latin typeface="맑은 고딕" panose="020B0503020000020004" pitchFamily="50" charset="-127"/>
-                <a:ea typeface="KoPub돋움체 Bold"/>
-              </a:rPr>
-              <a:t>펜토미노</a:t>
-            </a:r>
-            <a:endParaRPr lang="en-US" altLang="ko-KR" sz="1600" b="1" dirty="0" smtClean="0">
-              <a:latin typeface="맑은 고딕" panose="020B0503020000020004" pitchFamily="50" charset="-127"/>
-              <a:ea typeface="KoPub돋움체 Bold"/>
-            </a:endParaRPr>
-          </a:p>
-          <a:p>
-            <a:pPr marL="457200" lvl="0" indent="-330200">
-              <a:lnSpc>
-                <a:spcPct val="105000"/>
-              </a:lnSpc>
-              <a:buSzPts val="1600"/>
-              <a:buAutoNum type="arabicPeriod"/>
-            </a:pPr>
-            <a:r>
-              <a:rPr lang="ko-KR" altLang="en-US" sz="1600" b="1" dirty="0" smtClean="0">
-                <a:latin typeface="맑은 고딕" panose="020B0503020000020004" pitchFamily="50" charset="-127"/>
-                <a:ea typeface="KoPub돋움체 Bold"/>
-              </a:rPr>
-              <a:t>미니게임 </a:t>
-            </a:r>
-            <a:r>
-              <a:rPr lang="en-US" altLang="ko-KR" sz="1600" b="1" dirty="0" smtClean="0">
-                <a:latin typeface="맑은 고딕" panose="020B0503020000020004" pitchFamily="50" charset="-127"/>
-                <a:ea typeface="KoPub돋움체 Bold"/>
-              </a:rPr>
-              <a:t>– </a:t>
-            </a:r>
-            <a:r>
-              <a:rPr lang="ko-KR" altLang="en-US" sz="1600" b="1" dirty="0" err="1" smtClean="0">
-                <a:latin typeface="맑은 고딕" panose="020B0503020000020004" pitchFamily="50" charset="-127"/>
-                <a:ea typeface="KoPub돋움체 Bold"/>
-              </a:rPr>
-              <a:t>선자르기</a:t>
-            </a:r>
-            <a:endParaRPr lang="en-US" altLang="ko-KR" sz="1600" b="1" dirty="0" smtClean="0">
-              <a:latin typeface="맑은 고딕" panose="020B0503020000020004" pitchFamily="50" charset="-127"/>
-              <a:ea typeface="KoPub돋움체 Bold"/>
-            </a:endParaRPr>
-          </a:p>
-          <a:p>
-            <a:pPr marL="457200" lvl="0" indent="-330200">
-              <a:lnSpc>
-                <a:spcPct val="105000"/>
-              </a:lnSpc>
-              <a:buSzPts val="1600"/>
-              <a:buAutoNum type="arabicPeriod"/>
-            </a:pPr>
-            <a:r>
-              <a:rPr lang="ko-KR" altLang="en-US" sz="1600" b="1" dirty="0" smtClean="0">
-                <a:latin typeface="맑은 고딕" panose="020B0503020000020004" pitchFamily="50" charset="-127"/>
-                <a:ea typeface="KoPub돋움체 Bold"/>
-              </a:rPr>
-              <a:t>미니게임 </a:t>
-            </a:r>
-            <a:r>
-              <a:rPr lang="en-US" altLang="ko-KR" sz="1600" b="1" dirty="0" smtClean="0">
-                <a:latin typeface="맑은 고딕" panose="020B0503020000020004" pitchFamily="50" charset="-127"/>
-                <a:ea typeface="KoPub돋움체 Bold"/>
-              </a:rPr>
-              <a:t>– </a:t>
-            </a:r>
-            <a:r>
-              <a:rPr lang="ko-KR" altLang="en-US" sz="1600" b="1" dirty="0" smtClean="0">
-                <a:latin typeface="맑은 고딕" panose="020B0503020000020004" pitchFamily="50" charset="-127"/>
-                <a:ea typeface="KoPub돋움체 Bold"/>
-              </a:rPr>
-              <a:t>색 채우기</a:t>
-            </a:r>
-            <a:endParaRPr lang="en-US" altLang="ko-KR" sz="1600" b="1" dirty="0" smtClean="0">
-              <a:latin typeface="맑은 고딕" panose="020B0503020000020004" pitchFamily="50" charset="-127"/>
-              <a:ea typeface="KoPub돋움체 Bold"/>
-            </a:endParaRPr>
-          </a:p>
-          <a:p>
-            <a:pPr marL="457200" lvl="0" indent="-330200">
-              <a:lnSpc>
-                <a:spcPct val="105000"/>
-              </a:lnSpc>
-              <a:buSzPts val="1600"/>
-              <a:buAutoNum type="arabicPeriod"/>
-            </a:pPr>
-            <a:r>
-              <a:rPr lang="ko-KR" altLang="en-US" sz="1600" b="1" dirty="0" smtClean="0">
-                <a:latin typeface="맑은 고딕" panose="020B0503020000020004" pitchFamily="50" charset="-127"/>
-                <a:ea typeface="KoPub돋움체 Bold"/>
-              </a:rPr>
-              <a:t>미니게임 </a:t>
-            </a:r>
-            <a:r>
-              <a:rPr lang="en-US" altLang="ko-KR" sz="1600" b="1" dirty="0" smtClean="0">
-                <a:latin typeface="맑은 고딕" panose="020B0503020000020004" pitchFamily="50" charset="-127"/>
-                <a:ea typeface="KoPub돋움체 Bold"/>
-              </a:rPr>
-              <a:t>– </a:t>
-            </a:r>
-            <a:r>
-              <a:rPr lang="ko-KR" altLang="en-US" sz="1600" b="1" dirty="0" smtClean="0">
-                <a:latin typeface="맑은 고딕" panose="020B0503020000020004" pitchFamily="50" charset="-127"/>
-                <a:ea typeface="KoPub돋움체 Bold"/>
-              </a:rPr>
-              <a:t>꼼꼼히 색칠하기</a:t>
-            </a:r>
-            <a:endParaRPr lang="en-US" altLang="ko-KR" sz="1600" b="1" dirty="0" smtClean="0">
-              <a:latin typeface="맑은 고딕" panose="020B0503020000020004" pitchFamily="50" charset="-127"/>
-              <a:ea typeface="KoPub돋움체 Bold"/>
-            </a:endParaRPr>
+        </p:txBody>
+      </p:sp>
+      <p:pic>
+        <p:nvPicPr>
+          <p:cNvPr id="10" name="그림 9"/>
+          <p:cNvPicPr>
+            <a:picLocks noChangeAspect="1"/>
+          </p:cNvPicPr>
+          <p:nvPr/>
+        </p:nvPicPr>
+        <p:blipFill>
+          <a:blip r:embed="rId4"/>
+          <a:stretch>
+            <a:fillRect/>
+          </a:stretch>
+        </p:blipFill>
+        <p:spPr>
+          <a:xfrm>
+            <a:off x="1835696" y="3212976"/>
+            <a:ext cx="3844169" cy="1304772"/>
+          </a:xfrm>
+          <a:prstGeom prst="rect">
+            <a:avLst/>
+          </a:prstGeom>
+        </p:spPr>
+      </p:pic>
+      <p:sp>
+        <p:nvSpPr>
+          <p:cNvPr id="12" name="타원 11">
+            <a:extLst>
+              <a:ext uri="{FF2B5EF4-FFF2-40B4-BE49-F238E27FC236}">
+                <a16:creationId xmlns:a16="http://schemas.microsoft.com/office/drawing/2014/main" id="{46761064-C3F4-7FE6-476E-ACE003209DBC}"/>
+              </a:ext>
+            </a:extLst>
+          </p:cNvPr>
+          <p:cNvSpPr/>
+          <p:nvPr/>
+        </p:nvSpPr>
+        <p:spPr>
+          <a:xfrm>
+            <a:off x="3225508" y="3576981"/>
+            <a:ext cx="410388" cy="410388"/>
+          </a:xfrm>
+          <a:prstGeom prst="ellipse">
+            <a:avLst/>
+          </a:prstGeom>
+          <a:noFill/>
+          <a:ln>
+            <a:solidFill>
+              <a:schemeClr val="tx1"/>
+            </a:solidFill>
+          </a:ln>
+        </p:spPr>
+        <p:style>
+          <a:lnRef idx="2">
+            <a:schemeClr val="accent1">
+              <a:shade val="50000"/>
+            </a:schemeClr>
+          </a:lnRef>
+          <a:fillRef idx="1">
+            <a:schemeClr val="accent1"/>
+          </a:fillRef>
+          <a:effectRef idx="0">
+            <a:schemeClr val="accent1"/>
+          </a:effectRef>
+          <a:fontRef idx="minor">
+            <a:schemeClr val="lt1"/>
+          </a:fontRef>
+        </p:style>
+        <p:txBody>
+          <a:bodyPr rtlCol="0" anchor="ctr"/>
+          <a:lstStyle/>
+          <a:p>
+            <a:pPr algn="ctr"/>
+            <a:endParaRPr lang="ko-KR" altLang="en-US" dirty="0"/>
+          </a:p>
+        </p:txBody>
+      </p:sp>
+      <p:sp>
+        <p:nvSpPr>
+          <p:cNvPr id="4" name="타원 3">
+            <a:extLst>
+              <a:ext uri="{FF2B5EF4-FFF2-40B4-BE49-F238E27FC236}">
+                <a16:creationId xmlns:a16="http://schemas.microsoft.com/office/drawing/2014/main" id="{DB51844F-960B-A5CB-1262-3EB0704A6A91}"/>
+              </a:ext>
+            </a:extLst>
+          </p:cNvPr>
+          <p:cNvSpPr/>
+          <p:nvPr/>
+        </p:nvSpPr>
+        <p:spPr>
+          <a:xfrm>
+            <a:off x="3657556" y="3553968"/>
+            <a:ext cx="410388" cy="410388"/>
+          </a:xfrm>
+          <a:prstGeom prst="ellipse">
+            <a:avLst/>
+          </a:prstGeom>
+          <a:noFill/>
+          <a:ln>
+            <a:solidFill>
+              <a:schemeClr val="tx1"/>
+            </a:solidFill>
+          </a:ln>
+        </p:spPr>
+        <p:style>
+          <a:lnRef idx="2">
+            <a:schemeClr val="accent1">
+              <a:shade val="50000"/>
+            </a:schemeClr>
+          </a:lnRef>
+          <a:fillRef idx="1">
+            <a:schemeClr val="accent1"/>
+          </a:fillRef>
+          <a:effectRef idx="0">
+            <a:schemeClr val="accent1"/>
+          </a:effectRef>
+          <a:fontRef idx="minor">
+            <a:schemeClr val="lt1"/>
+          </a:fontRef>
+        </p:style>
+        <p:txBody>
+          <a:bodyPr rtlCol="0" anchor="ctr"/>
+          <a:lstStyle/>
+          <a:p>
+            <a:pPr algn="ctr"/>
+            <a:endParaRPr lang="ko-KR" altLang="en-US" dirty="0"/>
           </a:p>
         </p:txBody>
       </p:sp>
     </p:spTree>
     <p:extLst>
       <p:ext uri="{BB962C8B-B14F-4D97-AF65-F5344CB8AC3E}">
-        <p14:creationId xmlns:p14="http://schemas.microsoft.com/office/powerpoint/2010/main" val="1258066328"/>
+        <p14:creationId xmlns:p14="http://schemas.microsoft.com/office/powerpoint/2010/main" val="1572212307"/>
       </p:ext>
     </p:extLst>
   </p:cSld>
   <p:clrMapOvr>
     <a:masterClrMapping/>
   </p:clrMapOvr>
-  <p:timing>
-    <p:tnLst>
-      <p:par>
-        <p:cTn id="1" dur="indefinite" restart="never" nodeType="tmRoot"/>
-      </p:par>
-    </p:tnLst>
-  </p:timing>
 </p:sld>
 </file>
 
-<file path=ppt/slides/slide3.xml><?xml version="1.0" encoding="utf-8"?>
+<file path=ppt/slides/slide2.xml><?xml version="1.0" encoding="utf-8"?>
 <p:sld xmlns:a="http://schemas.openxmlformats.org/drawingml/2006/main" xmlns:r="http://schemas.openxmlformats.org/officeDocument/2006/relationships" xmlns:p="http://schemas.openxmlformats.org/presentationml/2006/main">
   <p:cSld>
     <p:bg>
@@ -11609,8 +11469,22 @@
           <a:bodyPr rtlCol="0" anchor="ctr"/>
           <a:lstStyle/>
           <a:p>
-            <a:pPr algn="ctr"/>
-            <a:endParaRPr lang="ko-KR" altLang="en-US">
+            <a:endParaRPr lang="ko-KR" altLang="en-US" dirty="0">
+              <a:solidFill>
+                <a:schemeClr val="tx1"/>
+              </a:solidFill>
+              <a:latin typeface="KoPub돋움체 Bold" pitchFamily="18" charset="-127"/>
+              <a:ea typeface="KoPub돋움체 Bold"/>
+            </a:endParaRPr>
+          </a:p>
+          <a:p>
+            <a:pPr marL="342900" indent="-342900">
+              <a:buAutoNum type="arabicPeriod"/>
+            </a:pPr>
+            <a:endParaRPr lang="ko-KR" altLang="en-US" dirty="0">
+              <a:solidFill>
+                <a:schemeClr val="tx1"/>
+              </a:solidFill>
               <a:latin typeface="KoPub돋움체 Bold" pitchFamily="18" charset="-127"/>
               <a:ea typeface="KoPub돋움체 Bold"/>
             </a:endParaRPr>
@@ -11692,7 +11566,511 @@
           <a:p>
             <a:pPr algn="ctr"/>
             <a:r>
-              <a:rPr lang="en-US" altLang="ko-KR" sz="2400" dirty="0" smtClean="0">
+              <a:rPr lang="en-US" altLang="ko-KR" sz="2400" dirty="0">
+                <a:solidFill>
+                  <a:schemeClr val="bg1"/>
+                </a:solidFill>
+                <a:latin typeface="KoPub돋움체 Bold" pitchFamily="18" charset="-127"/>
+                <a:ea typeface="KoPub돋움체 Bold"/>
+              </a:rPr>
+              <a:t>01</a:t>
+            </a:r>
+            <a:endParaRPr lang="ko-KR" altLang="en-US" sz="2400" dirty="0">
+              <a:solidFill>
+                <a:schemeClr val="bg1"/>
+              </a:solidFill>
+              <a:latin typeface="KoPub돋움체 Bold" pitchFamily="18" charset="-127"/>
+              <a:ea typeface="KoPub돋움체 Bold"/>
+            </a:endParaRPr>
+          </a:p>
+        </p:txBody>
+      </p:sp>
+      <p:sp>
+        <p:nvSpPr>
+          <p:cNvPr id="20" name="TextBox 19"/>
+          <p:cNvSpPr txBox="1"/>
+          <p:nvPr/>
+        </p:nvSpPr>
+        <p:spPr>
+          <a:xfrm>
+            <a:off x="427435" y="836712"/>
+            <a:ext cx="1192237" cy="1015663"/>
+          </a:xfrm>
+          <a:prstGeom prst="rect">
+            <a:avLst/>
+          </a:prstGeom>
+          <a:noFill/>
+        </p:spPr>
+        <p:txBody>
+          <a:bodyPr wrap="square" rtlCol="0">
+            <a:spAutoFit/>
+          </a:bodyPr>
+          <a:lstStyle/>
+          <a:p>
+            <a:r>
+              <a:rPr lang="ko-KR" altLang="en-US" sz="3600" b="1" spc="-150" dirty="0">
+                <a:solidFill>
+                  <a:schemeClr val="tx2">
+                    <a:lumMod val="75000"/>
+                  </a:schemeClr>
+                </a:solidFill>
+                <a:latin typeface="KoPub돋움체 Bold" pitchFamily="18" charset="-127"/>
+                <a:ea typeface="KoPub돋움체 Bold"/>
+              </a:rPr>
+              <a:t>목차</a:t>
+            </a:r>
+          </a:p>
+          <a:p>
+            <a:endParaRPr lang="ko-KR" altLang="en-US" sz="2400" dirty="0">
+              <a:solidFill>
+                <a:schemeClr val="tx2">
+                  <a:lumMod val="75000"/>
+                </a:schemeClr>
+              </a:solidFill>
+              <a:latin typeface="KoPub돋움체 Bold" pitchFamily="18" charset="-127"/>
+              <a:ea typeface="KoPub돋움체 Bold"/>
+            </a:endParaRPr>
+          </a:p>
+        </p:txBody>
+      </p:sp>
+      <p:sp>
+        <p:nvSpPr>
+          <p:cNvPr id="4" name="TextBox 3"/>
+          <p:cNvSpPr txBox="1"/>
+          <p:nvPr/>
+        </p:nvSpPr>
+        <p:spPr>
+          <a:xfrm>
+            <a:off x="755576" y="1628800"/>
+            <a:ext cx="4104456" cy="2419124"/>
+          </a:xfrm>
+          <a:prstGeom prst="rect">
+            <a:avLst/>
+          </a:prstGeom>
+          <a:noFill/>
+        </p:spPr>
+        <p:txBody>
+          <a:bodyPr wrap="square" rtlCol="0">
+            <a:spAutoFit/>
+          </a:bodyPr>
+          <a:lstStyle/>
+          <a:p>
+            <a:pPr marL="457200" lvl="0" indent="-330200">
+              <a:lnSpc>
+                <a:spcPct val="105000"/>
+              </a:lnSpc>
+              <a:buSzPts val="1600"/>
+              <a:buAutoNum type="arabicPeriod"/>
+            </a:pPr>
+            <a:r>
+              <a:rPr lang="ko-KR" altLang="en-US" sz="1600" b="1" dirty="0">
+                <a:latin typeface="맑은 고딕" panose="020B0503020000020004" pitchFamily="50" charset="-127"/>
+                <a:ea typeface="KoPub돋움체 Bold"/>
+              </a:rPr>
+              <a:t>개요 </a:t>
+            </a:r>
+            <a:r>
+              <a:rPr lang="en-US" altLang="ko-KR" sz="1600" b="1" dirty="0">
+                <a:latin typeface="맑은 고딕" panose="020B0503020000020004" pitchFamily="50" charset="-127"/>
+                <a:ea typeface="KoPub돋움체 Bold"/>
+              </a:rPr>
+              <a:t>&amp; </a:t>
+            </a:r>
+            <a:r>
+              <a:rPr lang="ko-KR" altLang="en-US" sz="1600" b="1" dirty="0" err="1">
+                <a:latin typeface="맑은 고딕" panose="020B0503020000020004" pitchFamily="50" charset="-127"/>
+                <a:ea typeface="KoPub돋움체 Bold"/>
+              </a:rPr>
+              <a:t>조작키</a:t>
+            </a:r>
+            <a:endParaRPr lang="en-US" altLang="ko-KR" sz="1600" b="1" dirty="0">
+              <a:latin typeface="맑은 고딕" panose="020B0503020000020004" pitchFamily="50" charset="-127"/>
+              <a:ea typeface="KoPub돋움체 Bold"/>
+            </a:endParaRPr>
+          </a:p>
+          <a:p>
+            <a:pPr marL="457200" lvl="0" indent="-330200">
+              <a:lnSpc>
+                <a:spcPct val="105000"/>
+              </a:lnSpc>
+              <a:buSzPts val="1600"/>
+              <a:buAutoNum type="arabicPeriod"/>
+            </a:pPr>
+            <a:r>
+              <a:rPr lang="ko-KR" altLang="en-US" sz="1600" b="1" dirty="0">
+                <a:latin typeface="맑은 고딕" panose="020B0503020000020004" pitchFamily="50" charset="-127"/>
+                <a:ea typeface="KoPub돋움체 Bold"/>
+              </a:rPr>
+              <a:t>캐릭터 시야 시스템</a:t>
+            </a:r>
+            <a:endParaRPr lang="en-US" altLang="ko-KR" sz="1600" b="1" dirty="0">
+              <a:latin typeface="맑은 고딕" panose="020B0503020000020004" pitchFamily="50" charset="-127"/>
+              <a:ea typeface="KoPub돋움체 Bold"/>
+            </a:endParaRPr>
+          </a:p>
+          <a:p>
+            <a:pPr marL="457200" lvl="0" indent="-330200">
+              <a:lnSpc>
+                <a:spcPct val="105000"/>
+              </a:lnSpc>
+              <a:buSzPts val="1600"/>
+              <a:buAutoNum type="arabicPeriod"/>
+            </a:pPr>
+            <a:r>
+              <a:rPr lang="ko-KR" altLang="en-US" sz="1600" b="1" dirty="0">
+                <a:latin typeface="맑은 고딕" panose="020B0503020000020004" pitchFamily="50" charset="-127"/>
+                <a:ea typeface="KoPub돋움체 Bold"/>
+              </a:rPr>
+              <a:t>단축키 정리</a:t>
+            </a:r>
+            <a:endParaRPr lang="en-US" altLang="ko-KR" sz="1600" b="1" dirty="0">
+              <a:latin typeface="맑은 고딕" panose="020B0503020000020004" pitchFamily="50" charset="-127"/>
+              <a:ea typeface="KoPub돋움체 Bold"/>
+            </a:endParaRPr>
+          </a:p>
+          <a:p>
+            <a:pPr marL="457200" lvl="0" indent="-330200">
+              <a:lnSpc>
+                <a:spcPct val="105000"/>
+              </a:lnSpc>
+              <a:buSzPts val="1600"/>
+              <a:buAutoNum type="arabicPeriod"/>
+            </a:pPr>
+            <a:r>
+              <a:rPr lang="ko-KR" altLang="en-US" sz="1600" b="1" dirty="0">
+                <a:latin typeface="맑은 고딕" panose="020B0503020000020004" pitchFamily="50" charset="-127"/>
+                <a:ea typeface="KoPub돋움체 Bold"/>
+              </a:rPr>
+              <a:t>미로 맵 구성</a:t>
+            </a:r>
+            <a:endParaRPr lang="en-US" altLang="ko-KR" sz="1600" b="1" dirty="0">
+              <a:latin typeface="맑은 고딕" panose="020B0503020000020004" pitchFamily="50" charset="-127"/>
+              <a:ea typeface="KoPub돋움체 Bold"/>
+            </a:endParaRPr>
+          </a:p>
+          <a:p>
+            <a:pPr marL="457200" lvl="0" indent="-330200">
+              <a:lnSpc>
+                <a:spcPct val="105000"/>
+              </a:lnSpc>
+              <a:buSzPts val="1600"/>
+              <a:buAutoNum type="arabicPeriod"/>
+            </a:pPr>
+            <a:r>
+              <a:rPr lang="ko-KR" altLang="en-US" sz="1600" b="1" dirty="0">
+                <a:latin typeface="맑은 고딕" panose="020B0503020000020004" pitchFamily="50" charset="-127"/>
+                <a:ea typeface="KoPub돋움체 Bold"/>
+              </a:rPr>
+              <a:t>게임 플레이 화면</a:t>
+            </a:r>
+            <a:endParaRPr lang="en-US" altLang="ko-KR" sz="1600" b="1" dirty="0">
+              <a:latin typeface="맑은 고딕" panose="020B0503020000020004" pitchFamily="50" charset="-127"/>
+              <a:ea typeface="KoPub돋움체 Bold"/>
+            </a:endParaRPr>
+          </a:p>
+          <a:p>
+            <a:pPr marL="457200" lvl="0" indent="-330200">
+              <a:lnSpc>
+                <a:spcPct val="105000"/>
+              </a:lnSpc>
+              <a:buSzPts val="1600"/>
+              <a:buAutoNum type="arabicPeriod"/>
+            </a:pPr>
+            <a:r>
+              <a:rPr lang="ko-KR" altLang="en-US" sz="1600" b="1" dirty="0">
+                <a:latin typeface="맑은 고딕" panose="020B0503020000020004" pitchFamily="50" charset="-127"/>
+                <a:ea typeface="KoPub돋움체 Bold"/>
+              </a:rPr>
+              <a:t>미니게임 </a:t>
+            </a:r>
+            <a:r>
+              <a:rPr lang="en-US" altLang="ko-KR" sz="1600" b="1" dirty="0">
+                <a:latin typeface="맑은 고딕" panose="020B0503020000020004" pitchFamily="50" charset="-127"/>
+                <a:ea typeface="KoPub돋움체 Bold"/>
+              </a:rPr>
+              <a:t>– </a:t>
+            </a:r>
+            <a:r>
+              <a:rPr lang="ko-KR" altLang="en-US" sz="1600" b="1" dirty="0" err="1">
+                <a:latin typeface="맑은 고딕" panose="020B0503020000020004" pitchFamily="50" charset="-127"/>
+                <a:ea typeface="KoPub돋움체 Bold"/>
+              </a:rPr>
+              <a:t>펜토미노</a:t>
+            </a:r>
+            <a:endParaRPr lang="en-US" altLang="ko-KR" sz="1600" b="1" dirty="0">
+              <a:latin typeface="맑은 고딕" panose="020B0503020000020004" pitchFamily="50" charset="-127"/>
+              <a:ea typeface="KoPub돋움체 Bold"/>
+            </a:endParaRPr>
+          </a:p>
+          <a:p>
+            <a:pPr marL="457200" lvl="0" indent="-330200">
+              <a:lnSpc>
+                <a:spcPct val="105000"/>
+              </a:lnSpc>
+              <a:buSzPts val="1600"/>
+              <a:buAutoNum type="arabicPeriod"/>
+            </a:pPr>
+            <a:r>
+              <a:rPr lang="ko-KR" altLang="en-US" sz="1600" b="1" dirty="0">
+                <a:latin typeface="맑은 고딕" panose="020B0503020000020004" pitchFamily="50" charset="-127"/>
+                <a:ea typeface="KoPub돋움체 Bold"/>
+              </a:rPr>
+              <a:t>미니게임 </a:t>
+            </a:r>
+            <a:r>
+              <a:rPr lang="en-US" altLang="ko-KR" sz="1600" b="1" dirty="0">
+                <a:latin typeface="맑은 고딕" panose="020B0503020000020004" pitchFamily="50" charset="-127"/>
+                <a:ea typeface="KoPub돋움체 Bold"/>
+              </a:rPr>
+              <a:t>– </a:t>
+            </a:r>
+            <a:r>
+              <a:rPr lang="ko-KR" altLang="en-US" sz="1600" b="1" dirty="0" err="1">
+                <a:latin typeface="맑은 고딕" panose="020B0503020000020004" pitchFamily="50" charset="-127"/>
+                <a:ea typeface="KoPub돋움체 Bold"/>
+              </a:rPr>
+              <a:t>선자르기</a:t>
+            </a:r>
+            <a:endParaRPr lang="en-US" altLang="ko-KR" sz="1600" b="1" dirty="0">
+              <a:latin typeface="맑은 고딕" panose="020B0503020000020004" pitchFamily="50" charset="-127"/>
+              <a:ea typeface="KoPub돋움체 Bold"/>
+            </a:endParaRPr>
+          </a:p>
+          <a:p>
+            <a:pPr marL="457200" lvl="0" indent="-330200">
+              <a:lnSpc>
+                <a:spcPct val="105000"/>
+              </a:lnSpc>
+              <a:buSzPts val="1600"/>
+              <a:buAutoNum type="arabicPeriod"/>
+            </a:pPr>
+            <a:r>
+              <a:rPr lang="ko-KR" altLang="en-US" sz="1600" b="1" dirty="0">
+                <a:latin typeface="맑은 고딕" panose="020B0503020000020004" pitchFamily="50" charset="-127"/>
+                <a:ea typeface="KoPub돋움체 Bold"/>
+              </a:rPr>
+              <a:t>미니게임 </a:t>
+            </a:r>
+            <a:r>
+              <a:rPr lang="en-US" altLang="ko-KR" sz="1600" b="1" dirty="0">
+                <a:latin typeface="맑은 고딕" panose="020B0503020000020004" pitchFamily="50" charset="-127"/>
+                <a:ea typeface="KoPub돋움체 Bold"/>
+              </a:rPr>
+              <a:t>– </a:t>
+            </a:r>
+            <a:r>
+              <a:rPr lang="ko-KR" altLang="en-US" sz="1600" b="1" dirty="0">
+                <a:latin typeface="맑은 고딕" panose="020B0503020000020004" pitchFamily="50" charset="-127"/>
+                <a:ea typeface="KoPub돋움체 Bold"/>
+              </a:rPr>
+              <a:t>색 채우기</a:t>
+            </a:r>
+            <a:endParaRPr lang="en-US" altLang="ko-KR" sz="1600" b="1" dirty="0">
+              <a:latin typeface="맑은 고딕" panose="020B0503020000020004" pitchFamily="50" charset="-127"/>
+              <a:ea typeface="KoPub돋움체 Bold"/>
+            </a:endParaRPr>
+          </a:p>
+          <a:p>
+            <a:pPr marL="457200" lvl="0" indent="-330200">
+              <a:lnSpc>
+                <a:spcPct val="105000"/>
+              </a:lnSpc>
+              <a:buSzPts val="1600"/>
+              <a:buAutoNum type="arabicPeriod"/>
+            </a:pPr>
+            <a:r>
+              <a:rPr lang="ko-KR" altLang="en-US" sz="1600" b="1" dirty="0">
+                <a:latin typeface="맑은 고딕" panose="020B0503020000020004" pitchFamily="50" charset="-127"/>
+                <a:ea typeface="KoPub돋움체 Bold"/>
+              </a:rPr>
+              <a:t>미니게임 </a:t>
+            </a:r>
+            <a:r>
+              <a:rPr lang="en-US" altLang="ko-KR" sz="1600" b="1" dirty="0">
+                <a:latin typeface="맑은 고딕" panose="020B0503020000020004" pitchFamily="50" charset="-127"/>
+                <a:ea typeface="KoPub돋움체 Bold"/>
+              </a:rPr>
+              <a:t>– </a:t>
+            </a:r>
+            <a:r>
+              <a:rPr lang="ko-KR" altLang="en-US" sz="1600" b="1" dirty="0">
+                <a:latin typeface="맑은 고딕" panose="020B0503020000020004" pitchFamily="50" charset="-127"/>
+                <a:ea typeface="KoPub돋움체 Bold"/>
+              </a:rPr>
+              <a:t>꼼꼼히 색칠하기</a:t>
+            </a:r>
+            <a:endParaRPr lang="en-US" altLang="ko-KR" sz="1600" b="1" dirty="0">
+              <a:latin typeface="맑은 고딕" panose="020B0503020000020004" pitchFamily="50" charset="-127"/>
+              <a:ea typeface="KoPub돋움체 Bold"/>
+            </a:endParaRPr>
+          </a:p>
+        </p:txBody>
+      </p:sp>
+    </p:spTree>
+    <p:extLst>
+      <p:ext uri="{BB962C8B-B14F-4D97-AF65-F5344CB8AC3E}">
+        <p14:creationId xmlns:p14="http://schemas.microsoft.com/office/powerpoint/2010/main" val="1258066328"/>
+      </p:ext>
+    </p:extLst>
+  </p:cSld>
+  <p:clrMapOvr>
+    <a:masterClrMapping/>
+  </p:clrMapOvr>
+</p:sld>
+</file>
+
+<file path=ppt/slides/slide3.xml><?xml version="1.0" encoding="utf-8"?>
+<p:sld xmlns:a="http://schemas.openxmlformats.org/drawingml/2006/main" xmlns:r="http://schemas.openxmlformats.org/officeDocument/2006/relationships" xmlns:p="http://schemas.openxmlformats.org/presentationml/2006/main">
+  <p:cSld>
+    <p:bg>
+      <p:bgPr>
+        <a:solidFill>
+          <a:schemeClr val="tx2">
+            <a:lumMod val="75000"/>
+          </a:schemeClr>
+        </a:solidFill>
+        <a:effectLst/>
+      </p:bgPr>
+    </p:bg>
+    <p:spTree>
+      <p:nvGrpSpPr>
+        <p:cNvPr id="1" name=""/>
+        <p:cNvGrpSpPr/>
+        <p:nvPr/>
+      </p:nvGrpSpPr>
+      <p:grpSpPr>
+        <a:xfrm>
+          <a:off x="0" y="0"/>
+          <a:ext cx="0" cy="0"/>
+          <a:chOff x="0" y="0"/>
+          <a:chExt cx="0" cy="0"/>
+        </a:xfrm>
+      </p:grpSpPr>
+      <p:sp>
+        <p:nvSpPr>
+          <p:cNvPr id="2" name="직사각형 1"/>
+          <p:cNvSpPr/>
+          <p:nvPr/>
+        </p:nvSpPr>
+        <p:spPr>
+          <a:xfrm>
+            <a:off x="251520" y="620688"/>
+            <a:ext cx="8640960" cy="5976664"/>
+          </a:xfrm>
+          <a:prstGeom prst="rect">
+            <a:avLst/>
+          </a:prstGeom>
+          <a:solidFill>
+            <a:schemeClr val="bg1"/>
+          </a:solidFill>
+          <a:ln>
+            <a:noFill/>
+          </a:ln>
+        </p:spPr>
+        <p:style>
+          <a:lnRef idx="2">
+            <a:schemeClr val="accent1">
+              <a:shade val="50000"/>
+            </a:schemeClr>
+          </a:lnRef>
+          <a:fillRef idx="1">
+            <a:schemeClr val="accent1"/>
+          </a:fillRef>
+          <a:effectRef idx="0">
+            <a:schemeClr val="accent1"/>
+          </a:effectRef>
+          <a:fontRef idx="minor">
+            <a:schemeClr val="lt1"/>
+          </a:fontRef>
+        </p:style>
+        <p:txBody>
+          <a:bodyPr rtlCol="0" anchor="ctr"/>
+          <a:lstStyle/>
+          <a:p>
+            <a:pPr algn="ctr"/>
+            <a:endParaRPr lang="ko-KR" altLang="en-US">
+              <a:latin typeface="KoPub돋움체 Bold" pitchFamily="18" charset="-127"/>
+              <a:ea typeface="KoPub돋움체 Bold"/>
+            </a:endParaRPr>
+          </a:p>
+        </p:txBody>
+      </p:sp>
+      <p:sp>
+        <p:nvSpPr>
+          <p:cNvPr id="3" name="타원 2"/>
+          <p:cNvSpPr/>
+          <p:nvPr/>
+        </p:nvSpPr>
+        <p:spPr>
+          <a:xfrm>
+            <a:off x="4067944" y="74100"/>
+            <a:ext cx="936104" cy="936104"/>
+          </a:xfrm>
+          <a:prstGeom prst="ellipse">
+            <a:avLst/>
+          </a:prstGeom>
+          <a:solidFill>
+            <a:schemeClr val="tx2">
+              <a:lumMod val="75000"/>
+            </a:schemeClr>
+          </a:solidFill>
+          <a:ln>
+            <a:noFill/>
+          </a:ln>
+        </p:spPr>
+        <p:style>
+          <a:lnRef idx="2">
+            <a:schemeClr val="accent1">
+              <a:shade val="50000"/>
+            </a:schemeClr>
+          </a:lnRef>
+          <a:fillRef idx="1">
+            <a:schemeClr val="accent1"/>
+          </a:fillRef>
+          <a:effectRef idx="0">
+            <a:schemeClr val="accent1"/>
+          </a:effectRef>
+          <a:fontRef idx="minor">
+            <a:schemeClr val="lt1"/>
+          </a:fontRef>
+        </p:style>
+        <p:txBody>
+          <a:bodyPr rtlCol="0" anchor="ctr"/>
+          <a:lstStyle/>
+          <a:p>
+            <a:pPr algn="ctr"/>
+            <a:endParaRPr lang="ko-KR" altLang="en-US">
+              <a:latin typeface="KoPub돋움체 Bold" pitchFamily="18" charset="-127"/>
+              <a:ea typeface="KoPub돋움체 Bold"/>
+            </a:endParaRPr>
+          </a:p>
+        </p:txBody>
+      </p:sp>
+      <p:sp>
+        <p:nvSpPr>
+          <p:cNvPr id="9" name="TextBox 8"/>
+          <p:cNvSpPr txBox="1"/>
+          <p:nvPr/>
+        </p:nvSpPr>
+        <p:spPr>
+          <a:xfrm>
+            <a:off x="3995936" y="479095"/>
+            <a:ext cx="1080120" cy="461665"/>
+          </a:xfrm>
+          <a:prstGeom prst="rect">
+            <a:avLst/>
+          </a:prstGeom>
+          <a:noFill/>
+        </p:spPr>
+        <p:txBody>
+          <a:bodyPr wrap="square" rtlCol="0">
+            <a:spAutoFit/>
+          </a:bodyPr>
+          <a:lstStyle/>
+          <a:p>
+            <a:pPr algn="ctr"/>
+            <a:r>
+              <a:rPr lang="en-US" altLang="ko-KR" sz="2400" dirty="0">
                 <a:solidFill>
                   <a:schemeClr val="bg1"/>
                 </a:solidFill>
@@ -11734,7 +12112,7 @@
           <a:lstStyle/>
           <a:p>
             <a:r>
-              <a:rPr lang="ko-KR" altLang="en-US" sz="2000" b="1" spc="-150" dirty="0" smtClean="0">
+              <a:rPr lang="ko-KR" altLang="en-US" sz="2000" b="1" spc="-150" dirty="0">
                 <a:solidFill>
                   <a:srgbClr val="1F497D">
                     <a:lumMod val="75000"/>
@@ -11746,7 +12124,7 @@
               <a:t>개요 </a:t>
             </a:r>
             <a:r>
-              <a:rPr lang="en-US" altLang="ko-KR" sz="2000" b="1" spc="-150" dirty="0" smtClean="0">
+              <a:rPr lang="en-US" altLang="ko-KR" sz="2000" b="1" spc="-150" dirty="0">
                 <a:solidFill>
                   <a:srgbClr val="1F497D">
                     <a:lumMod val="75000"/>
@@ -11758,7 +12136,7 @@
               <a:t>&amp;</a:t>
             </a:r>
             <a:r>
-              <a:rPr lang="ko-KR" altLang="en-US" sz="2000" b="1" spc="-150" dirty="0" smtClean="0">
+              <a:rPr lang="ko-KR" altLang="en-US" sz="2000" b="1" spc="-150" dirty="0">
                 <a:solidFill>
                   <a:srgbClr val="1F497D">
                     <a:lumMod val="75000"/>
@@ -11770,7 +12148,7 @@
               <a:t> </a:t>
             </a:r>
             <a:r>
-              <a:rPr lang="ko-KR" altLang="en-US" sz="2000" b="1" spc="-150" dirty="0" err="1" smtClean="0">
+              <a:rPr lang="ko-KR" altLang="en-US" sz="2000" b="1" spc="-150" dirty="0" err="1">
                 <a:solidFill>
                   <a:srgbClr val="1F497D">
                     <a:lumMod val="75000"/>
@@ -12085,35 +12463,35 @@
               </a:lnSpc>
             </a:pPr>
             <a:r>
-              <a:rPr lang="ko-KR" altLang="en-US" sz="1600" dirty="0" smtClean="0">
+              <a:rPr lang="ko-KR" altLang="en-US" sz="1600" dirty="0">
                 <a:latin typeface="KoPub돋움체 Bold" pitchFamily="18" charset="-127"/>
                 <a:ea typeface="KoPub돋움체 Bold"/>
               </a:rPr>
               <a:t>게임 장르 </a:t>
             </a:r>
             <a:r>
-              <a:rPr lang="en-US" altLang="ko-KR" sz="1600" dirty="0" smtClean="0">
+              <a:rPr lang="en-US" altLang="ko-KR" sz="1600" dirty="0">
                 <a:latin typeface="KoPub돋움체 Bold" pitchFamily="18" charset="-127"/>
                 <a:ea typeface="KoPub돋움체 Bold"/>
               </a:rPr>
               <a:t>: </a:t>
             </a:r>
             <a:r>
-              <a:rPr lang="ko-KR" altLang="en-US" sz="1600" dirty="0" smtClean="0">
+              <a:rPr lang="ko-KR" altLang="en-US" sz="1600" dirty="0">
                 <a:latin typeface="KoPub돋움체 Bold" pitchFamily="18" charset="-127"/>
                 <a:ea typeface="KoPub돋움체 Bold"/>
               </a:rPr>
               <a:t>퍼즐</a:t>
             </a:r>
             <a:r>
-              <a:rPr lang="en-US" altLang="ko-KR" sz="1600" dirty="0" smtClean="0">
+              <a:rPr lang="en-US" altLang="ko-KR" sz="1600" dirty="0">
                 <a:latin typeface="KoPub돋움체 Bold" pitchFamily="18" charset="-127"/>
                 <a:ea typeface="KoPub돋움체 Bold"/>
               </a:rPr>
               <a:t>, </a:t>
             </a:r>
             <a:r>
-              <a:rPr lang="ko-KR" altLang="en-US" sz="1600" dirty="0" smtClean="0">
+              <a:rPr lang="ko-KR" altLang="en-US" sz="1600" dirty="0">
                 <a:latin typeface="KoPub돋움체 Bold" pitchFamily="18" charset="-127"/>
                 <a:ea typeface="KoPub돋움체 Bold"/>
               </a:rPr>
@@ -12131,21 +12509,21 @@
               </a:lnSpc>
             </a:pPr>
             <a:r>
-              <a:rPr lang="ko-KR" altLang="en-US" sz="1600" dirty="0" smtClean="0">
+              <a:rPr lang="ko-KR" altLang="en-US" sz="1600" dirty="0">
                 <a:latin typeface="KoPub돋움체 Bold" pitchFamily="18" charset="-127"/>
                 <a:ea typeface="KoPub돋움체 Bold"/>
               </a:rPr>
               <a:t>시점 </a:t>
             </a:r>
             <a:r>
-              <a:rPr lang="en-US" altLang="ko-KR" sz="1600" dirty="0" smtClean="0">
+              <a:rPr lang="en-US" altLang="ko-KR" sz="1600" dirty="0">
                 <a:latin typeface="KoPub돋움체 Bold" pitchFamily="18" charset="-127"/>
                 <a:ea typeface="KoPub돋움체 Bold"/>
               </a:rPr>
               <a:t>: 2D </a:t>
             </a:r>
             <a:r>
-              <a:rPr lang="ko-KR" altLang="en-US" sz="1600" dirty="0" err="1" smtClean="0">
+              <a:rPr lang="ko-KR" altLang="en-US" sz="1600" dirty="0" err="1">
                 <a:latin typeface="KoPub돋움체 Bold" pitchFamily="18" charset="-127"/>
                 <a:ea typeface="KoPub돋움체 Bold"/>
               </a:rPr>
@@ -12163,28 +12541,28 @@
               </a:lnSpc>
             </a:pPr>
             <a:r>
-              <a:rPr lang="ko-KR" altLang="en-US" sz="1600" dirty="0" smtClean="0">
+              <a:rPr lang="ko-KR" altLang="en-US" sz="1600" dirty="0">
                 <a:latin typeface="KoPub돋움체 Bold" pitchFamily="18" charset="-127"/>
                 <a:ea typeface="KoPub돋움체 Bold"/>
               </a:rPr>
               <a:t>진행 방식 </a:t>
             </a:r>
             <a:r>
-              <a:rPr lang="en-US" altLang="ko-KR" sz="1600" dirty="0" smtClean="0">
+              <a:rPr lang="en-US" altLang="ko-KR" sz="1600" dirty="0">
                 <a:latin typeface="KoPub돋움체 Bold" pitchFamily="18" charset="-127"/>
                 <a:ea typeface="KoPub돋움체 Bold"/>
               </a:rPr>
               <a:t>: </a:t>
             </a:r>
             <a:r>
-              <a:rPr lang="ko-KR" altLang="en-US" sz="1600" dirty="0" smtClean="0">
+              <a:rPr lang="ko-KR" altLang="en-US" sz="1600" dirty="0">
                 <a:latin typeface="KoPub돋움체 Bold" pitchFamily="18" charset="-127"/>
                 <a:ea typeface="KoPub돋움체 Bold"/>
               </a:rPr>
               <a:t>플레이어는 미니게임 벽이 있는 미로에서 미니게임을 통과하며 길을 찾아 탈출구를 향해서 가야한다</a:t>
             </a:r>
             <a:r>
-              <a:rPr lang="en-US" altLang="ko-KR" sz="1600" dirty="0" smtClean="0">
+              <a:rPr lang="en-US" altLang="ko-KR" sz="1600" dirty="0">
                 <a:latin typeface="KoPub돋움체 Bold" pitchFamily="18" charset="-127"/>
                 <a:ea typeface="KoPub돋움체 Bold"/>
               </a:rPr>
@@ -12239,13 +12617,6 @@
   <p:clrMapOvr>
     <a:masterClrMapping/>
   </p:clrMapOvr>
-  <p:timing>
-    <p:tnLst>
-      <p:par>
-        <p:cTn id="1" dur="indefinite" restart="never" nodeType="tmRoot"/>
-      </p:par>
-    </p:tnLst>
-  </p:timing>
 </p:sld>
 </file>
 
@@ -12400,7 +12771,7 @@
           <a:p>
             <a:pPr algn="ctr"/>
             <a:r>
-              <a:rPr lang="en-US" altLang="ko-KR" sz="2400" dirty="0" smtClean="0">
+              <a:rPr lang="en-US" altLang="ko-KR" sz="2400" dirty="0">
                 <a:solidFill>
                   <a:schemeClr val="bg1"/>
                 </a:solidFill>
@@ -12442,7 +12813,7 @@
           <a:lstStyle/>
           <a:p>
             <a:r>
-              <a:rPr lang="ko-KR" altLang="en-US" sz="2000" b="1" spc="-150" smtClean="0">
+              <a:rPr lang="ko-KR" altLang="en-US" sz="2000" b="1" spc="-150">
                 <a:solidFill>
                   <a:srgbClr val="1F497D">
                     <a:lumMod val="75000"/>
@@ -12454,7 +12825,7 @@
               <a:t>캐릭터 시야 </a:t>
             </a:r>
             <a:r>
-              <a:rPr lang="ko-KR" altLang="en-US" sz="2000" b="1" spc="-150" dirty="0" smtClean="0">
+              <a:rPr lang="ko-KR" altLang="en-US" sz="2000" b="1" spc="-150" dirty="0">
                 <a:solidFill>
                   <a:srgbClr val="1F497D">
                     <a:lumMod val="75000"/>
@@ -12465,15 +12836,6 @@
               </a:rPr>
               <a:t>시스템</a:t>
             </a:r>
-            <a:endParaRPr lang="ko-KR" altLang="en-US" sz="2000" b="1" spc="-150" dirty="0">
-              <a:solidFill>
-                <a:srgbClr val="1F497D">
-                  <a:lumMod val="75000"/>
-                </a:srgbClr>
-              </a:solidFill>
-              <a:latin typeface="KoPub돋움체 Bold" pitchFamily="18" charset="-127"/>
-              <a:ea typeface="KoPub돋움체 Bold" pitchFamily="18" charset="-127"/>
-            </a:endParaRPr>
           </a:p>
         </p:txBody>
       </p:sp>
@@ -12561,14 +12923,14 @@
               <a:buChar char="-"/>
             </a:pPr>
             <a:r>
-              <a:rPr lang="ko-KR" altLang="en-US" sz="1600" dirty="0" smtClean="0">
+              <a:rPr lang="ko-KR" altLang="en-US" sz="1600" dirty="0">
                 <a:latin typeface="KoPub돋움체 Bold" pitchFamily="18" charset="-127"/>
                 <a:ea typeface="KoPub돋움체 Bold"/>
               </a:rPr>
               <a:t>캐릭터의 시야는 플레이어의 캐릭터를 중심으로 원형으로만 불빛이 생기고 나머지 부분은 어둡다</a:t>
             </a:r>
             <a:r>
-              <a:rPr lang="en-US" altLang="ko-KR" sz="1600" dirty="0" smtClean="0">
+              <a:rPr lang="en-US" altLang="ko-KR" sz="1600" dirty="0">
                 <a:latin typeface="KoPub돋움체 Bold" pitchFamily="18" charset="-127"/>
                 <a:ea typeface="KoPub돋움체 Bold"/>
               </a:rPr>
@@ -12584,27 +12946,27 @@
               <a:buChar char="-"/>
             </a:pPr>
             <a:r>
-              <a:rPr lang="ko-KR" altLang="en-US" sz="1600" dirty="0" smtClean="0">
+              <a:rPr lang="ko-KR" altLang="en-US" sz="1600" dirty="0">
                 <a:latin typeface="KoPub돋움체 Bold" pitchFamily="18" charset="-127"/>
                 <a:ea typeface="KoPub돋움체 Bold"/>
               </a:rPr>
               <a:t>원형 불빛의 크기는 가로와 세로가 같으며</a:t>
             </a:r>
             <a:r>
-              <a:rPr lang="en-US" altLang="ko-KR" sz="1600" dirty="0" smtClean="0">
+              <a:rPr lang="en-US" altLang="ko-KR" sz="1600" dirty="0">
                 <a:latin typeface="KoPub돋움체 Bold" pitchFamily="18" charset="-127"/>
                 <a:ea typeface="KoPub돋움체 Bold"/>
               </a:rPr>
               <a:t>, </a:t>
             </a:r>
             <a:r>
-              <a:rPr lang="ko-KR" altLang="en-US" sz="1600" dirty="0" smtClean="0">
+              <a:rPr lang="ko-KR" altLang="en-US" sz="1600" dirty="0">
                 <a:latin typeface="KoPub돋움체 Bold" pitchFamily="18" charset="-127"/>
                 <a:ea typeface="KoPub돋움체 Bold"/>
               </a:rPr>
               <a:t>정확한 수치는 테스트 예정</a:t>
             </a:r>
-            <a:endParaRPr lang="en-US" altLang="ko-KR" sz="1600" dirty="0" smtClean="0">
+            <a:endParaRPr lang="en-US" altLang="ko-KR" sz="1600" dirty="0">
               <a:latin typeface="KoPub돋움체 Bold" pitchFamily="18" charset="-127"/>
               <a:ea typeface="KoPub돋움체 Bold"/>
             </a:endParaRPr>
@@ -13048,44 +13410,40 @@
           <a:lstStyle/>
           <a:p>
             <a:r>
-              <a:rPr lang="ko-KR" altLang="en-US" dirty="0" smtClean="0">
+              <a:rPr lang="ko-KR" altLang="en-US" dirty="0">
                 <a:latin typeface="KoPub돋움체 Bold" panose="02020603020101020101" pitchFamily="18" charset="-127"/>
                 <a:ea typeface="KoPub돋움체 Bold" panose="02020603020101020101" pitchFamily="18" charset="-127"/>
               </a:rPr>
               <a:t>게임 </a:t>
             </a:r>
             <a:r>
-              <a:rPr lang="en-US" altLang="ko-KR" dirty="0" smtClean="0">
+              <a:rPr lang="en-US" altLang="ko-KR" dirty="0">
                 <a:latin typeface="KoPub돋움체 Bold" panose="02020603020101020101" pitchFamily="18" charset="-127"/>
                 <a:ea typeface="KoPub돋움체 Bold" panose="02020603020101020101" pitchFamily="18" charset="-127"/>
               </a:rPr>
               <a:t>&lt;</a:t>
             </a:r>
             <a:r>
-              <a:rPr lang="ko-KR" altLang="en-US" dirty="0" smtClean="0">
+              <a:rPr lang="ko-KR" altLang="en-US" dirty="0">
                 <a:latin typeface="KoPub돋움체 Bold" panose="02020603020101020101" pitchFamily="18" charset="-127"/>
                 <a:ea typeface="KoPub돋움체 Bold" panose="02020603020101020101" pitchFamily="18" charset="-127"/>
               </a:rPr>
               <a:t>마녀의 집</a:t>
             </a:r>
             <a:r>
-              <a:rPr lang="en-US" altLang="ko-KR" dirty="0" smtClean="0">
+              <a:rPr lang="en-US" altLang="ko-KR" dirty="0">
                 <a:latin typeface="KoPub돋움체 Bold" panose="02020603020101020101" pitchFamily="18" charset="-127"/>
                 <a:ea typeface="KoPub돋움체 Bold" panose="02020603020101020101" pitchFamily="18" charset="-127"/>
               </a:rPr>
               <a:t>&gt; </a:t>
             </a:r>
             <a:r>
-              <a:rPr lang="ko-KR" altLang="en-US" dirty="0" smtClean="0">
+              <a:rPr lang="ko-KR" altLang="en-US" dirty="0">
                 <a:latin typeface="KoPub돋움체 Bold" panose="02020603020101020101" pitchFamily="18" charset="-127"/>
                 <a:ea typeface="KoPub돋움체 Bold" panose="02020603020101020101" pitchFamily="18" charset="-127"/>
               </a:rPr>
               <a:t>레퍼런스 자료</a:t>
             </a:r>
-            <a:endParaRPr lang="ko-KR" altLang="en-US" dirty="0">
-              <a:latin typeface="KoPub돋움체 Bold" panose="02020603020101020101" pitchFamily="18" charset="-127"/>
-              <a:ea typeface="KoPub돋움체 Bold" panose="02020603020101020101" pitchFamily="18" charset="-127"/>
-            </a:endParaRPr>
           </a:p>
         </p:txBody>
       </p:sp>
@@ -13099,13 +13457,6 @@
   <p:clrMapOvr>
     <a:masterClrMapping/>
   </p:clrMapOvr>
-  <p:timing>
-    <p:tnLst>
-      <p:par>
-        <p:cTn id="1" dur="indefinite" restart="never" nodeType="tmRoot"/>
-      </p:par>
-    </p:tnLst>
-  </p:timing>
 </p:sld>
 </file>
 
@@ -13260,7 +13611,7 @@
           <a:p>
             <a:pPr algn="ctr"/>
             <a:r>
-              <a:rPr lang="en-US" altLang="ko-KR" sz="2400" dirty="0" smtClean="0">
+              <a:rPr lang="en-US" altLang="ko-KR" sz="2400" dirty="0">
                 <a:solidFill>
                   <a:schemeClr val="bg1"/>
                 </a:solidFill>
@@ -13302,7 +13653,7 @@
           <a:lstStyle/>
           <a:p>
             <a:r>
-              <a:rPr lang="ko-KR" altLang="en-US" sz="2000" b="1" spc="-150" smtClean="0">
+              <a:rPr lang="ko-KR" altLang="en-US" sz="2000" b="1" spc="-150">
                 <a:solidFill>
                   <a:srgbClr val="1F497D">
                     <a:lumMod val="75000"/>
@@ -13314,7 +13665,7 @@
               <a:t>캐릭터 시야 </a:t>
             </a:r>
             <a:r>
-              <a:rPr lang="ko-KR" altLang="en-US" sz="2000" b="1" spc="-150" dirty="0" smtClean="0">
+              <a:rPr lang="ko-KR" altLang="en-US" sz="2000" b="1" spc="-150" dirty="0">
                 <a:solidFill>
                   <a:srgbClr val="1F497D">
                     <a:lumMod val="75000"/>
@@ -13325,15 +13676,6 @@
               </a:rPr>
               <a:t>시스템</a:t>
             </a:r>
-            <a:endParaRPr lang="ko-KR" altLang="en-US" sz="2000" b="1" spc="-150" dirty="0">
-              <a:solidFill>
-                <a:srgbClr val="1F497D">
-                  <a:lumMod val="75000"/>
-                </a:srgbClr>
-              </a:solidFill>
-              <a:latin typeface="KoPub돋움체 Bold" pitchFamily="18" charset="-127"/>
-              <a:ea typeface="KoPub돋움체 Bold" pitchFamily="18" charset="-127"/>
-            </a:endParaRPr>
           </a:p>
         </p:txBody>
       </p:sp>
@@ -13939,23 +14281,19 @@
           <a:lstStyle/>
           <a:p>
             <a:r>
-              <a:rPr lang="ko-KR" altLang="en-US" dirty="0" err="1" smtClean="0">
+              <a:rPr lang="ko-KR" altLang="en-US" dirty="0" err="1">
                 <a:latin typeface="KoPub돋움체 Bold" panose="02020603020101020101" pitchFamily="18" charset="-127"/>
                 <a:ea typeface="KoPub돋움체 Bold" panose="02020603020101020101" pitchFamily="18" charset="-127"/>
               </a:rPr>
               <a:t>인게임</a:t>
             </a:r>
             <a:r>
-              <a:rPr lang="ko-KR" altLang="en-US" dirty="0" smtClean="0">
+              <a:rPr lang="ko-KR" altLang="en-US" dirty="0">
                 <a:latin typeface="KoPub돋움체 Bold" panose="02020603020101020101" pitchFamily="18" charset="-127"/>
                 <a:ea typeface="KoPub돋움체 Bold" panose="02020603020101020101" pitchFamily="18" charset="-127"/>
               </a:rPr>
               <a:t> 내 플레이어 시야 예시</a:t>
             </a:r>
-            <a:endParaRPr lang="ko-KR" altLang="en-US" dirty="0">
-              <a:latin typeface="KoPub돋움체 Bold" panose="02020603020101020101" pitchFamily="18" charset="-127"/>
-              <a:ea typeface="KoPub돋움체 Bold" panose="02020603020101020101" pitchFamily="18" charset="-127"/>
-            </a:endParaRPr>
           </a:p>
         </p:txBody>
       </p:sp>
@@ -13969,13 +14307,6 @@
   <p:clrMapOvr>
     <a:masterClrMapping/>
   </p:clrMapOvr>
-  <p:timing>
-    <p:tnLst>
-      <p:par>
-        <p:cTn id="1" dur="indefinite" restart="never" nodeType="tmRoot"/>
-      </p:par>
-    </p:tnLst>
-  </p:timing>
 </p:sld>
 </file>
 
@@ -14130,7 +14461,7 @@
           <a:p>
             <a:pPr algn="ctr"/>
             <a:r>
-              <a:rPr lang="en-US" altLang="ko-KR" sz="2400" dirty="0" smtClean="0">
+              <a:rPr lang="en-US" altLang="ko-KR" sz="2400" dirty="0">
                 <a:solidFill>
                   <a:schemeClr val="bg1"/>
                 </a:solidFill>
@@ -14193,7 +14524,7 @@
           <a:lstStyle/>
           <a:p>
             <a:r>
-              <a:rPr lang="ko-KR" altLang="en-US" dirty="0" smtClean="0">
+              <a:rPr lang="ko-KR" altLang="en-US" dirty="0">
                 <a:solidFill>
                   <a:schemeClr val="tx1"/>
                 </a:solidFill>
@@ -14202,7 +14533,7 @@
               </a:rPr>
               <a:t>고정 단축키</a:t>
             </a:r>
-            <a:endParaRPr lang="en-US" altLang="ko-KR" dirty="0" smtClean="0">
+            <a:endParaRPr lang="en-US" altLang="ko-KR" dirty="0">
               <a:solidFill>
                 <a:schemeClr val="tx1"/>
               </a:solidFill>
@@ -14216,7 +14547,7 @@
               <a:buChar char="•"/>
             </a:pPr>
             <a:r>
-              <a:rPr lang="ko-KR" altLang="en-US" dirty="0" smtClean="0">
+              <a:rPr lang="ko-KR" altLang="en-US" dirty="0">
                 <a:solidFill>
                   <a:schemeClr val="tx1"/>
                 </a:solidFill>
@@ -14226,7 +14557,7 @@
               <a:t>저장 </a:t>
             </a:r>
             <a:r>
-              <a:rPr lang="en-US" altLang="ko-KR" dirty="0" smtClean="0">
+              <a:rPr lang="en-US" altLang="ko-KR" dirty="0">
                 <a:solidFill>
                   <a:schemeClr val="tx1"/>
                 </a:solidFill>
@@ -14236,7 +14567,7 @@
               <a:t>(</a:t>
             </a:r>
             <a:r>
-              <a:rPr lang="en-US" altLang="ko-KR" dirty="0" err="1" smtClean="0">
+              <a:rPr lang="en-US" altLang="ko-KR" dirty="0" err="1">
                 <a:solidFill>
                   <a:schemeClr val="tx1"/>
                 </a:solidFill>
@@ -14246,7 +14577,7 @@
               <a:t>Ctrl+S</a:t>
             </a:r>
             <a:r>
-              <a:rPr lang="en-US" altLang="ko-KR" dirty="0" smtClean="0">
+              <a:rPr lang="en-US" altLang="ko-KR" dirty="0">
                 <a:solidFill>
                   <a:schemeClr val="tx1"/>
                 </a:solidFill>
@@ -14262,7 +14593,7 @@
               <a:buChar char="•"/>
             </a:pPr>
             <a:r>
-              <a:rPr lang="ko-KR" altLang="en-US" dirty="0" err="1" smtClean="0">
+              <a:rPr lang="ko-KR" altLang="en-US" dirty="0" err="1">
                 <a:solidFill>
                   <a:schemeClr val="tx1"/>
                 </a:solidFill>
@@ -14272,7 +14603,7 @@
               <a:t>뒤로가기</a:t>
             </a:r>
             <a:r>
-              <a:rPr lang="ko-KR" altLang="en-US" dirty="0" smtClean="0">
+              <a:rPr lang="ko-KR" altLang="en-US" dirty="0">
                 <a:solidFill>
                   <a:schemeClr val="tx1"/>
                 </a:solidFill>
@@ -14282,7 +14613,7 @@
               <a:t> </a:t>
             </a:r>
             <a:r>
-              <a:rPr lang="en-US" altLang="ko-KR" dirty="0" smtClean="0">
+              <a:rPr lang="en-US" altLang="ko-KR" dirty="0">
                 <a:solidFill>
                   <a:schemeClr val="tx1"/>
                 </a:solidFill>
@@ -14292,7 +14623,7 @@
               <a:t>(</a:t>
             </a:r>
             <a:r>
-              <a:rPr lang="en-US" altLang="ko-KR" dirty="0" err="1" smtClean="0">
+              <a:rPr lang="en-US" altLang="ko-KR" dirty="0" err="1">
                 <a:solidFill>
                   <a:schemeClr val="tx1"/>
                 </a:solidFill>
@@ -14302,7 +14633,7 @@
               <a:t>Ctrl+Z</a:t>
             </a:r>
             <a:r>
-              <a:rPr lang="en-US" altLang="ko-KR" dirty="0" smtClean="0">
+              <a:rPr lang="en-US" altLang="ko-KR" dirty="0">
                 <a:solidFill>
                   <a:schemeClr val="tx1"/>
                 </a:solidFill>
@@ -14318,7 +14649,7 @@
               <a:buChar char="•"/>
             </a:pPr>
             <a:r>
-              <a:rPr lang="ko-KR" altLang="en-US" dirty="0" smtClean="0">
+              <a:rPr lang="ko-KR" altLang="en-US" dirty="0">
                 <a:solidFill>
                   <a:schemeClr val="tx1"/>
                 </a:solidFill>
@@ -14328,7 +14659,7 @@
               <a:t>종료 </a:t>
             </a:r>
             <a:r>
-              <a:rPr lang="en-US" altLang="ko-KR" dirty="0" smtClean="0">
+              <a:rPr lang="en-US" altLang="ko-KR" dirty="0">
                 <a:solidFill>
                   <a:schemeClr val="tx1"/>
                 </a:solidFill>
@@ -14353,7 +14684,7 @@
           </a:p>
           <a:p>
             <a:r>
-              <a:rPr lang="ko-KR" altLang="en-US" dirty="0" err="1" smtClean="0">
+              <a:rPr lang="ko-KR" altLang="en-US" dirty="0" err="1">
                 <a:solidFill>
                   <a:schemeClr val="tx1"/>
                 </a:solidFill>
@@ -14363,7 +14694,7 @@
               <a:t>퍼즐게임에</a:t>
             </a:r>
             <a:r>
-              <a:rPr lang="ko-KR" altLang="en-US" dirty="0" smtClean="0">
+              <a:rPr lang="ko-KR" altLang="en-US" dirty="0">
                 <a:solidFill>
                   <a:schemeClr val="tx1"/>
                 </a:solidFill>
@@ -14372,7 +14703,7 @@
               </a:rPr>
               <a:t> 이용되는 단축키</a:t>
             </a:r>
-            <a:endParaRPr lang="en-US" altLang="ko-KR" dirty="0" smtClean="0">
+            <a:endParaRPr lang="en-US" altLang="ko-KR" dirty="0">
               <a:solidFill>
                 <a:schemeClr val="tx1"/>
               </a:solidFill>
@@ -14386,7 +14717,7 @@
               <a:buChar char="•"/>
             </a:pPr>
             <a:r>
-              <a:rPr lang="ko-KR" altLang="en-US" dirty="0" err="1" smtClean="0">
+              <a:rPr lang="ko-KR" altLang="en-US" dirty="0" err="1">
                 <a:solidFill>
                   <a:schemeClr val="tx1"/>
                 </a:solidFill>
@@ -14396,7 +14727,7 @@
               <a:t>자유변형</a:t>
             </a:r>
             <a:r>
-              <a:rPr lang="ko-KR" altLang="en-US" dirty="0" smtClean="0">
+              <a:rPr lang="ko-KR" altLang="en-US" dirty="0">
                 <a:solidFill>
                   <a:schemeClr val="tx1"/>
                 </a:solidFill>
@@ -14406,7 +14737,7 @@
               <a:t> </a:t>
             </a:r>
             <a:r>
-              <a:rPr lang="en-US" altLang="ko-KR" dirty="0" smtClean="0">
+              <a:rPr lang="en-US" altLang="ko-KR" dirty="0">
                 <a:solidFill>
                   <a:schemeClr val="tx1"/>
                 </a:solidFill>
@@ -14416,7 +14747,7 @@
               <a:t>(</a:t>
             </a:r>
             <a:r>
-              <a:rPr lang="en-US" altLang="ko-KR" dirty="0" err="1" smtClean="0">
+              <a:rPr lang="en-US" altLang="ko-KR" dirty="0" err="1">
                 <a:solidFill>
                   <a:schemeClr val="tx1"/>
                 </a:solidFill>
@@ -14426,7 +14757,7 @@
               <a:t>Ctrl+T</a:t>
             </a:r>
             <a:r>
-              <a:rPr lang="en-US" altLang="ko-KR" dirty="0" smtClean="0">
+              <a:rPr lang="en-US" altLang="ko-KR" dirty="0">
                 <a:solidFill>
                   <a:schemeClr val="tx1"/>
                 </a:solidFill>
@@ -14442,7 +14773,7 @@
               <a:buChar char="•"/>
             </a:pPr>
             <a:r>
-              <a:rPr lang="ko-KR" altLang="en-US" dirty="0" smtClean="0">
+              <a:rPr lang="ko-KR" altLang="en-US" dirty="0">
                 <a:solidFill>
                   <a:schemeClr val="tx1"/>
                 </a:solidFill>
@@ -14452,7 +14783,7 @@
               <a:t>레이어 복제하기 </a:t>
             </a:r>
             <a:r>
-              <a:rPr lang="en-US" altLang="ko-KR" dirty="0" smtClean="0">
+              <a:rPr lang="en-US" altLang="ko-KR" dirty="0">
                 <a:solidFill>
                   <a:schemeClr val="tx1"/>
                 </a:solidFill>
@@ -14462,7 +14793,7 @@
               <a:t>(</a:t>
             </a:r>
             <a:r>
-              <a:rPr lang="en-US" altLang="ko-KR" dirty="0" err="1" smtClean="0">
+              <a:rPr lang="en-US" altLang="ko-KR" dirty="0" err="1">
                 <a:solidFill>
                   <a:schemeClr val="tx1"/>
                 </a:solidFill>
@@ -14472,7 +14803,7 @@
               <a:t>Ctrl+J</a:t>
             </a:r>
             <a:r>
-              <a:rPr lang="en-US" altLang="ko-KR" dirty="0" smtClean="0">
+              <a:rPr lang="en-US" altLang="ko-KR" dirty="0">
                 <a:solidFill>
                   <a:schemeClr val="tx1"/>
                 </a:solidFill>
@@ -14488,7 +14819,7 @@
               <a:buChar char="•"/>
             </a:pPr>
             <a:r>
-              <a:rPr lang="ko-KR" altLang="en-US" dirty="0" smtClean="0">
+              <a:rPr lang="ko-KR" altLang="en-US" dirty="0">
                 <a:solidFill>
                   <a:schemeClr val="tx1"/>
                 </a:solidFill>
@@ -14498,7 +14829,7 @@
               <a:t>페인트 통 </a:t>
             </a:r>
             <a:r>
-              <a:rPr lang="en-US" altLang="ko-KR" dirty="0" smtClean="0">
+              <a:rPr lang="en-US" altLang="ko-KR" dirty="0">
                 <a:solidFill>
                   <a:schemeClr val="tx1"/>
                 </a:solidFill>
@@ -14508,7 +14839,7 @@
               <a:t>(G+</a:t>
             </a:r>
             <a:r>
-              <a:rPr lang="ko-KR" altLang="en-US" dirty="0" smtClean="0">
+              <a:rPr lang="ko-KR" altLang="en-US" dirty="0">
                 <a:solidFill>
                   <a:schemeClr val="tx1"/>
                 </a:solidFill>
@@ -14518,7 +14849,7 @@
               <a:t>클릭</a:t>
             </a:r>
             <a:r>
-              <a:rPr lang="en-US" altLang="ko-KR" dirty="0" smtClean="0">
+              <a:rPr lang="en-US" altLang="ko-KR" dirty="0">
                 <a:solidFill>
                   <a:schemeClr val="tx1"/>
                 </a:solidFill>
@@ -14534,7 +14865,7 @@
               <a:buChar char="•"/>
             </a:pPr>
             <a:r>
-              <a:rPr lang="ko-KR" altLang="en-US" dirty="0" smtClean="0">
+              <a:rPr lang="ko-KR" altLang="en-US" dirty="0">
                 <a:solidFill>
                   <a:schemeClr val="tx1"/>
                 </a:solidFill>
@@ -14544,7 +14875,7 @@
               <a:t>표시자 보이기</a:t>
             </a:r>
             <a:r>
-              <a:rPr lang="en-US" altLang="ko-KR" dirty="0" smtClean="0">
+              <a:rPr lang="en-US" altLang="ko-KR" dirty="0">
                 <a:solidFill>
                   <a:schemeClr val="tx1"/>
                 </a:solidFill>
@@ -14554,7 +14885,7 @@
               <a:t>/</a:t>
             </a:r>
             <a:r>
-              <a:rPr lang="ko-KR" altLang="en-US" dirty="0" smtClean="0">
+              <a:rPr lang="ko-KR" altLang="en-US" dirty="0">
                 <a:solidFill>
                   <a:schemeClr val="tx1"/>
                 </a:solidFill>
@@ -14564,7 +14895,7 @@
               <a:t>숨기기 </a:t>
             </a:r>
             <a:r>
-              <a:rPr lang="en-US" altLang="ko-KR" dirty="0" smtClean="0">
+              <a:rPr lang="en-US" altLang="ko-KR" dirty="0">
                 <a:solidFill>
                   <a:schemeClr val="tx1"/>
                 </a:solidFill>
@@ -14574,7 +14905,7 @@
               <a:t>(</a:t>
             </a:r>
             <a:r>
-              <a:rPr lang="en-US" altLang="ko-KR" dirty="0" err="1" smtClean="0">
+              <a:rPr lang="en-US" altLang="ko-KR" dirty="0" err="1">
                 <a:solidFill>
                   <a:schemeClr val="tx1"/>
                 </a:solidFill>
@@ -14584,7 +14915,7 @@
               <a:t>Ctrl+R</a:t>
             </a:r>
             <a:r>
-              <a:rPr lang="en-US" altLang="ko-KR" dirty="0" smtClean="0">
+              <a:rPr lang="en-US" altLang="ko-KR" dirty="0">
                 <a:solidFill>
                   <a:schemeClr val="tx1"/>
                 </a:solidFill>
@@ -14600,7 +14931,7 @@
               <a:buChar char="•"/>
             </a:pPr>
             <a:r>
-              <a:rPr lang="ko-KR" altLang="en-US" dirty="0" smtClean="0">
+              <a:rPr lang="ko-KR" altLang="en-US" dirty="0">
                 <a:solidFill>
                   <a:schemeClr val="tx1"/>
                 </a:solidFill>
@@ -14610,7 +14941,7 @@
               <a:t>선택한 영역 잘라내기 </a:t>
             </a:r>
             <a:r>
-              <a:rPr lang="en-US" altLang="ko-KR" dirty="0" smtClean="0">
+              <a:rPr lang="en-US" altLang="ko-KR" dirty="0">
                 <a:solidFill>
                   <a:schemeClr val="tx1"/>
                 </a:solidFill>
@@ -14626,7 +14957,7 @@
               <a:buChar char="•"/>
             </a:pPr>
             <a:r>
-              <a:rPr lang="ko-KR" altLang="en-US" dirty="0" err="1" smtClean="0">
+              <a:rPr lang="ko-KR" altLang="en-US" dirty="0" err="1">
                 <a:solidFill>
                   <a:schemeClr val="tx1"/>
                 </a:solidFill>
@@ -14636,7 +14967,7 @@
               <a:t>브러쉬</a:t>
             </a:r>
             <a:r>
-              <a:rPr lang="ko-KR" altLang="en-US" dirty="0" smtClean="0">
+              <a:rPr lang="ko-KR" altLang="en-US" dirty="0">
                 <a:solidFill>
                   <a:schemeClr val="tx1"/>
                 </a:solidFill>
@@ -14646,7 +14977,7 @@
               <a:t> 크기 조정 </a:t>
             </a:r>
             <a:r>
-              <a:rPr lang="en-US" altLang="ko-KR" dirty="0" smtClean="0">
+              <a:rPr lang="en-US" altLang="ko-KR" dirty="0">
                 <a:solidFill>
                   <a:schemeClr val="tx1"/>
                 </a:solidFill>
@@ -14656,7 +14987,7 @@
               <a:t>([ = </a:t>
             </a:r>
             <a:r>
-              <a:rPr lang="ko-KR" altLang="en-US" dirty="0" smtClean="0">
+              <a:rPr lang="ko-KR" altLang="en-US" dirty="0">
                 <a:solidFill>
                   <a:schemeClr val="tx1"/>
                 </a:solidFill>
@@ -14666,7 +14997,7 @@
               <a:t>작게</a:t>
             </a:r>
             <a:r>
-              <a:rPr lang="en-US" altLang="ko-KR" dirty="0" smtClean="0">
+              <a:rPr lang="en-US" altLang="ko-KR" dirty="0">
                 <a:solidFill>
                   <a:schemeClr val="tx1"/>
                 </a:solidFill>
@@ -14676,7 +15007,7 @@
               <a:t>, ] = </a:t>
             </a:r>
             <a:r>
-              <a:rPr lang="ko-KR" altLang="en-US" dirty="0" smtClean="0">
+              <a:rPr lang="ko-KR" altLang="en-US" dirty="0">
                 <a:solidFill>
                   <a:schemeClr val="tx1"/>
                 </a:solidFill>
@@ -14686,7 +15017,7 @@
               <a:t>크게</a:t>
             </a:r>
             <a:r>
-              <a:rPr lang="en-US" altLang="ko-KR" dirty="0" smtClean="0">
+              <a:rPr lang="en-US" altLang="ko-KR" dirty="0">
                 <a:solidFill>
                   <a:schemeClr val="tx1"/>
                 </a:solidFill>
@@ -14728,7 +15059,7 @@
           <a:lstStyle/>
           <a:p>
             <a:r>
-              <a:rPr lang="ko-KR" altLang="en-US" sz="2000" b="1" spc="-150" smtClean="0">
+              <a:rPr lang="ko-KR" altLang="en-US" sz="2000" b="1" spc="-150">
                 <a:solidFill>
                   <a:schemeClr val="tx2">
                     <a:lumMod val="75000"/>
@@ -14761,13 +15092,6 @@
   <p:clrMapOvr>
     <a:masterClrMapping/>
   </p:clrMapOvr>
-  <p:timing>
-    <p:tnLst>
-      <p:par>
-        <p:cTn id="1" dur="indefinite" restart="never" nodeType="tmRoot"/>
-      </p:par>
-    </p:tnLst>
-  </p:timing>
 </p:sld>
 </file>
 
@@ -14922,7 +15246,7 @@
           <a:p>
             <a:pPr algn="ctr"/>
             <a:r>
-              <a:rPr lang="en-US" altLang="ko-KR" sz="2400" dirty="0" smtClean="0">
+              <a:rPr lang="en-US" altLang="ko-KR" sz="2400" dirty="0">
                 <a:solidFill>
                   <a:schemeClr val="bg1"/>
                 </a:solidFill>
@@ -14964,7 +15288,7 @@
           <a:lstStyle/>
           <a:p>
             <a:r>
-              <a:rPr lang="ko-KR" altLang="en-US" sz="2000" b="1" spc="-150" dirty="0" smtClean="0">
+              <a:rPr lang="ko-KR" altLang="en-US" sz="2000" b="1" spc="-150" dirty="0">
                 <a:solidFill>
                   <a:schemeClr val="tx2">
                     <a:lumMod val="75000"/>
@@ -14975,15 +15299,6 @@
               </a:rPr>
               <a:t>미로 맵 구성</a:t>
             </a:r>
-            <a:endParaRPr lang="ko-KR" altLang="en-US" sz="2000" b="1" spc="-150" dirty="0">
-              <a:solidFill>
-                <a:schemeClr val="tx2">
-                  <a:lumMod val="75000"/>
-                </a:schemeClr>
-              </a:solidFill>
-              <a:latin typeface="KoPub돋움체 Bold" panose="02030600000101010101" pitchFamily="18" charset="-127"/>
-              <a:ea typeface="KoPub돋움체 Bold" panose="02030600000101010101" pitchFamily="18" charset="-127"/>
-            </a:endParaRPr>
           </a:p>
         </p:txBody>
       </p:sp>
@@ -15021,13 +15336,6 @@
   <p:clrMapOvr>
     <a:masterClrMapping/>
   </p:clrMapOvr>
-  <p:timing>
-    <p:tnLst>
-      <p:par>
-        <p:cTn id="1" dur="indefinite" restart="never" nodeType="tmRoot"/>
-      </p:par>
-    </p:tnLst>
-  </p:timing>
 </p:sld>
 </file>
 
@@ -15182,7 +15490,7 @@
           <a:p>
             <a:pPr algn="ctr"/>
             <a:r>
-              <a:rPr lang="en-US" altLang="ko-KR" sz="2400" dirty="0" smtClean="0">
+              <a:rPr lang="en-US" altLang="ko-KR" sz="2400" dirty="0">
                 <a:solidFill>
                   <a:schemeClr val="bg1"/>
                 </a:solidFill>
@@ -15224,7 +15532,7 @@
           <a:lstStyle/>
           <a:p>
             <a:r>
-              <a:rPr lang="ko-KR" altLang="en-US" sz="2000" b="1" spc="-150" smtClean="0">
+              <a:rPr lang="ko-KR" altLang="en-US" sz="2000" b="1" spc="-150">
                 <a:solidFill>
                   <a:schemeClr val="tx2">
                     <a:lumMod val="75000"/>
@@ -15236,7 +15544,7 @@
               <a:t>게임 플레이 화면 </a:t>
             </a:r>
             <a:r>
-              <a:rPr lang="en-US" altLang="ko-KR" sz="2000" b="1" spc="-150" dirty="0" smtClean="0">
+              <a:rPr lang="en-US" altLang="ko-KR" sz="2000" b="1" spc="-150" dirty="0">
                 <a:solidFill>
                   <a:schemeClr val="tx2">
                     <a:lumMod val="75000"/>
@@ -15248,7 +15556,7 @@
               <a:t>- </a:t>
             </a:r>
             <a:r>
-              <a:rPr lang="ko-KR" altLang="en-US" sz="2000" b="1" spc="-150" dirty="0" err="1" smtClean="0">
+              <a:rPr lang="ko-KR" altLang="en-US" sz="2000" b="1" spc="-150" dirty="0" err="1">
                 <a:solidFill>
                   <a:schemeClr val="tx2">
                     <a:lumMod val="75000"/>
@@ -15305,13 +15613,6 @@
   <p:clrMapOvr>
     <a:masterClrMapping/>
   </p:clrMapOvr>
-  <p:timing>
-    <p:tnLst>
-      <p:par>
-        <p:cTn id="1" dur="indefinite" restart="never" nodeType="tmRoot"/>
-      </p:par>
-    </p:tnLst>
-  </p:timing>
 </p:sld>
 </file>
 
@@ -15466,7 +15767,7 @@
           <a:p>
             <a:pPr algn="ctr"/>
             <a:r>
-              <a:rPr lang="en-US" altLang="ko-KR" sz="2400" dirty="0" smtClean="0">
+              <a:rPr lang="en-US" altLang="ko-KR" sz="2400" dirty="0">
                 <a:solidFill>
                   <a:schemeClr val="bg1"/>
                 </a:solidFill>
@@ -15508,7 +15809,7 @@
           <a:lstStyle/>
           <a:p>
             <a:r>
-              <a:rPr lang="ko-KR" altLang="en-US" sz="2000" b="1" spc="-150" dirty="0" smtClean="0">
+              <a:rPr lang="ko-KR" altLang="en-US" sz="2000" b="1" spc="-150" dirty="0">
                 <a:solidFill>
                   <a:schemeClr val="tx2">
                     <a:lumMod val="75000"/>
@@ -15520,7 +15821,7 @@
               <a:t>게임 플레이 화면 </a:t>
             </a:r>
             <a:r>
-              <a:rPr lang="en-US" altLang="ko-KR" sz="2000" b="1" spc="-150" dirty="0" smtClean="0">
+              <a:rPr lang="en-US" altLang="ko-KR" sz="2000" b="1" spc="-150" dirty="0">
                 <a:solidFill>
                   <a:schemeClr val="tx2">
                     <a:lumMod val="75000"/>
@@ -15532,7 +15833,7 @@
               <a:t>- </a:t>
             </a:r>
             <a:r>
-              <a:rPr lang="ko-KR" altLang="en-US" sz="2000" b="1" spc="-150" dirty="0" smtClean="0">
+              <a:rPr lang="ko-KR" altLang="en-US" sz="2000" b="1" spc="-150" dirty="0">
                 <a:solidFill>
                   <a:schemeClr val="tx2">
                     <a:lumMod val="75000"/>
@@ -15543,15 +15844,6 @@
               </a:rPr>
               <a:t>포토샵</a:t>
             </a:r>
-            <a:endParaRPr lang="ko-KR" altLang="en-US" sz="2000" b="1" spc="-150" dirty="0">
-              <a:solidFill>
-                <a:schemeClr val="tx2">
-                  <a:lumMod val="75000"/>
-                </a:schemeClr>
-              </a:solidFill>
-              <a:latin typeface="KoPub돋움체 Bold" panose="02030600000101010101" pitchFamily="18" charset="-127"/>
-              <a:ea typeface="KoPub돋움체 Bold" panose="02030600000101010101" pitchFamily="18" charset="-127"/>
-            </a:endParaRPr>
           </a:p>
         </p:txBody>
       </p:sp>
@@ -15589,13 +15881,6 @@
   <p:clrMapOvr>
     <a:masterClrMapping/>
   </p:clrMapOvr>
-  <p:timing>
-    <p:tnLst>
-      <p:par>
-        <p:cTn id="1" dur="indefinite" restart="never" nodeType="tmRoot"/>
-      </p:par>
-    </p:tnLst>
-  </p:timing>
 </p:sld>
 </file>
 

</xml_diff>